<commit_message>
remove the date from twittter presentation
</commit_message>
<xml_diff>
--- a/Problem 1/Tweet sentiment analysis presentation.pptx
+++ b/Problem 1/Tweet sentiment analysis presentation.pptx
@@ -21,7 +21,7 @@
     <p:sldId id="267" r:id="rId16"/>
   </p:sldIdLst>
   <p:sldSz cx="10080625" cy="7559675"/>
-  <p:notesSz cx="7559675" cy="10691812"/>
+  <p:notesSz cx="7772400" cy="10058400"/>
 </p:presentation>
 </file>
 
@@ -77,7 +77,7 @@
         <p:spPr>
           <a:xfrm>
             <a:off x="504000" y="-11160"/>
-            <a:ext cx="9071280" cy="1262160"/>
+            <a:ext cx="9070920" cy="1262160"/>
           </a:xfrm>
           <a:prstGeom prst="rect">
             <a:avLst/>
@@ -89,7 +89,7 @@
           </a:bodyPr>
           <a:p>
             <a:pPr algn="ctr"/>
-            <a:endParaRPr b="0" lang="en-EG" sz="4400" spc="-1" strike="noStrike">
+            <a:endParaRPr b="0" lang="en-US" sz="4400" spc="-1" strike="noStrike">
               <a:latin typeface="Arial"/>
             </a:endParaRPr>
           </a:p>
@@ -119,7 +119,7 @@
             <a:normAutofit/>
           </a:bodyPr>
           <a:p>
-            <a:endParaRPr b="0" lang="en-EG" sz="3200" spc="-1" strike="noStrike">
+            <a:endParaRPr b="0" lang="en-US" sz="3200" spc="-1" strike="noStrike">
               <a:latin typeface="Arial"/>
             </a:endParaRPr>
           </a:p>
@@ -149,7 +149,7 @@
             <a:normAutofit/>
           </a:bodyPr>
           <a:p>
-            <a:endParaRPr b="0" lang="en-EG" sz="3200" spc="-1" strike="noStrike">
+            <a:endParaRPr b="0" lang="en-US" sz="3200" spc="-1" strike="noStrike">
               <a:latin typeface="Arial"/>
             </a:endParaRPr>
           </a:p>
@@ -190,7 +190,7 @@
         <p:spPr>
           <a:xfrm>
             <a:off x="504000" y="-11160"/>
-            <a:ext cx="9071280" cy="1262160"/>
+            <a:ext cx="9070920" cy="1262160"/>
           </a:xfrm>
           <a:prstGeom prst="rect">
             <a:avLst/>
@@ -202,7 +202,7 @@
           </a:bodyPr>
           <a:p>
             <a:pPr algn="ctr"/>
-            <a:endParaRPr b="0" lang="en-EG" sz="4400" spc="-1" strike="noStrike">
+            <a:endParaRPr b="0" lang="en-US" sz="4400" spc="-1" strike="noStrike">
               <a:latin typeface="Arial"/>
             </a:endParaRPr>
           </a:p>
@@ -232,7 +232,7 @@
             <a:normAutofit/>
           </a:bodyPr>
           <a:p>
-            <a:endParaRPr b="0" lang="en-EG" sz="3200" spc="-1" strike="noStrike">
+            <a:endParaRPr b="0" lang="en-US" sz="3200" spc="-1" strike="noStrike">
               <a:latin typeface="Arial"/>
             </a:endParaRPr>
           </a:p>
@@ -262,7 +262,7 @@
             <a:normAutofit/>
           </a:bodyPr>
           <a:p>
-            <a:endParaRPr b="0" lang="en-EG" sz="3200" spc="-1" strike="noStrike">
+            <a:endParaRPr b="0" lang="en-US" sz="3200" spc="-1" strike="noStrike">
               <a:latin typeface="Arial"/>
             </a:endParaRPr>
           </a:p>
@@ -292,7 +292,7 @@
             <a:normAutofit/>
           </a:bodyPr>
           <a:p>
-            <a:endParaRPr b="0" lang="en-EG" sz="3200" spc="-1" strike="noStrike">
+            <a:endParaRPr b="0" lang="en-US" sz="3200" spc="-1" strike="noStrike">
               <a:latin typeface="Arial"/>
             </a:endParaRPr>
           </a:p>
@@ -322,7 +322,7 @@
             <a:normAutofit/>
           </a:bodyPr>
           <a:p>
-            <a:endParaRPr b="0" lang="en-EG" sz="3200" spc="-1" strike="noStrike">
+            <a:endParaRPr b="0" lang="en-US" sz="3200" spc="-1" strike="noStrike">
               <a:latin typeface="Arial"/>
             </a:endParaRPr>
           </a:p>
@@ -363,7 +363,7 @@
         <p:spPr>
           <a:xfrm>
             <a:off x="504000" y="-11160"/>
-            <a:ext cx="9071280" cy="1262160"/>
+            <a:ext cx="9070920" cy="1262160"/>
           </a:xfrm>
           <a:prstGeom prst="rect">
             <a:avLst/>
@@ -375,7 +375,7 @@
           </a:bodyPr>
           <a:p>
             <a:pPr algn="ctr"/>
-            <a:endParaRPr b="0" lang="en-EG" sz="4400" spc="-1" strike="noStrike">
+            <a:endParaRPr b="0" lang="en-US" sz="4400" spc="-1" strike="noStrike">
               <a:latin typeface="Arial"/>
             </a:endParaRPr>
           </a:p>
@@ -405,7 +405,7 @@
             <a:normAutofit/>
           </a:bodyPr>
           <a:p>
-            <a:endParaRPr b="0" lang="en-EG" sz="3200" spc="-1" strike="noStrike">
+            <a:endParaRPr b="0" lang="en-US" sz="3200" spc="-1" strike="noStrike">
               <a:latin typeface="Arial"/>
             </a:endParaRPr>
           </a:p>
@@ -435,7 +435,7 @@
             <a:normAutofit/>
           </a:bodyPr>
           <a:p>
-            <a:endParaRPr b="0" lang="en-EG" sz="3200" spc="-1" strike="noStrike">
+            <a:endParaRPr b="0" lang="en-US" sz="3200" spc="-1" strike="noStrike">
               <a:latin typeface="Arial"/>
             </a:endParaRPr>
           </a:p>
@@ -465,7 +465,7 @@
             <a:normAutofit/>
           </a:bodyPr>
           <a:p>
-            <a:endParaRPr b="0" lang="en-EG" sz="3200" spc="-1" strike="noStrike">
+            <a:endParaRPr b="0" lang="en-US" sz="3200" spc="-1" strike="noStrike">
               <a:latin typeface="Arial"/>
             </a:endParaRPr>
           </a:p>
@@ -495,7 +495,7 @@
             <a:normAutofit/>
           </a:bodyPr>
           <a:p>
-            <a:endParaRPr b="0" lang="en-EG" sz="3200" spc="-1" strike="noStrike">
+            <a:endParaRPr b="0" lang="en-US" sz="3200" spc="-1" strike="noStrike">
               <a:latin typeface="Arial"/>
             </a:endParaRPr>
           </a:p>
@@ -525,7 +525,7 @@
             <a:normAutofit/>
           </a:bodyPr>
           <a:p>
-            <a:endParaRPr b="0" lang="en-EG" sz="3200" spc="-1" strike="noStrike">
+            <a:endParaRPr b="0" lang="en-US" sz="3200" spc="-1" strike="noStrike">
               <a:latin typeface="Arial"/>
             </a:endParaRPr>
           </a:p>
@@ -555,7 +555,7 @@
             <a:normAutofit/>
           </a:bodyPr>
           <a:p>
-            <a:endParaRPr b="0" lang="en-EG" sz="3200" spc="-1" strike="noStrike">
+            <a:endParaRPr b="0" lang="en-US" sz="3200" spc="-1" strike="noStrike">
               <a:latin typeface="Arial"/>
             </a:endParaRPr>
           </a:p>
@@ -618,7 +618,7 @@
         <p:spPr>
           <a:xfrm>
             <a:off x="504000" y="-11160"/>
-            <a:ext cx="9071280" cy="1262160"/>
+            <a:ext cx="9070920" cy="1262160"/>
           </a:xfrm>
           <a:prstGeom prst="rect">
             <a:avLst/>
@@ -630,7 +630,7 @@
           </a:bodyPr>
           <a:p>
             <a:pPr algn="ctr"/>
-            <a:endParaRPr b="0" lang="en-EG" sz="4400" spc="-1" strike="noStrike">
+            <a:endParaRPr b="0" lang="en-US" sz="4400" spc="-1" strike="noStrike">
               <a:latin typeface="Arial"/>
             </a:endParaRPr>
           </a:p>
@@ -661,7 +661,7 @@
           </a:bodyPr>
           <a:p>
             <a:pPr algn="ctr"/>
-            <a:endParaRPr b="0" lang="en-EG" sz="3200" spc="-1" strike="noStrike">
+            <a:endParaRPr b="0" lang="en-US" sz="3200" spc="-1" strike="noStrike">
               <a:latin typeface="Arial"/>
             </a:endParaRPr>
           </a:p>
@@ -702,7 +702,7 @@
         <p:spPr>
           <a:xfrm>
             <a:off x="504000" y="-11160"/>
-            <a:ext cx="9071280" cy="1262160"/>
+            <a:ext cx="9070920" cy="1262160"/>
           </a:xfrm>
           <a:prstGeom prst="rect">
             <a:avLst/>
@@ -714,7 +714,7 @@
           </a:bodyPr>
           <a:p>
             <a:pPr algn="ctr"/>
-            <a:endParaRPr b="0" lang="en-EG" sz="4400" spc="-1" strike="noStrike">
+            <a:endParaRPr b="0" lang="en-US" sz="4400" spc="-1" strike="noStrike">
               <a:latin typeface="Arial"/>
             </a:endParaRPr>
           </a:p>
@@ -744,7 +744,7 @@
             <a:normAutofit/>
           </a:bodyPr>
           <a:p>
-            <a:endParaRPr b="0" lang="en-EG" sz="3200" spc="-1" strike="noStrike">
+            <a:endParaRPr b="0" lang="en-US" sz="3200" spc="-1" strike="noStrike">
               <a:latin typeface="Arial"/>
             </a:endParaRPr>
           </a:p>
@@ -785,7 +785,7 @@
         <p:spPr>
           <a:xfrm>
             <a:off x="504000" y="-11160"/>
-            <a:ext cx="9071280" cy="1262160"/>
+            <a:ext cx="9070920" cy="1262160"/>
           </a:xfrm>
           <a:prstGeom prst="rect">
             <a:avLst/>
@@ -797,7 +797,7 @@
           </a:bodyPr>
           <a:p>
             <a:pPr algn="ctr"/>
-            <a:endParaRPr b="0" lang="en-EG" sz="4400" spc="-1" strike="noStrike">
+            <a:endParaRPr b="0" lang="en-US" sz="4400" spc="-1" strike="noStrike">
               <a:latin typeface="Arial"/>
             </a:endParaRPr>
           </a:p>
@@ -827,7 +827,7 @@
             <a:normAutofit/>
           </a:bodyPr>
           <a:p>
-            <a:endParaRPr b="0" lang="en-EG" sz="3200" spc="-1" strike="noStrike">
+            <a:endParaRPr b="0" lang="en-US" sz="3200" spc="-1" strike="noStrike">
               <a:latin typeface="Arial"/>
             </a:endParaRPr>
           </a:p>
@@ -857,7 +857,7 @@
             <a:normAutofit/>
           </a:bodyPr>
           <a:p>
-            <a:endParaRPr b="0" lang="en-EG" sz="3200" spc="-1" strike="noStrike">
+            <a:endParaRPr b="0" lang="en-US" sz="3200" spc="-1" strike="noStrike">
               <a:latin typeface="Arial"/>
             </a:endParaRPr>
           </a:p>
@@ -898,7 +898,7 @@
         <p:spPr>
           <a:xfrm>
             <a:off x="504000" y="-11160"/>
-            <a:ext cx="9071280" cy="1262160"/>
+            <a:ext cx="9070920" cy="1262160"/>
           </a:xfrm>
           <a:prstGeom prst="rect">
             <a:avLst/>
@@ -910,7 +910,7 @@
           </a:bodyPr>
           <a:p>
             <a:pPr algn="ctr"/>
-            <a:endParaRPr b="0" lang="en-EG" sz="4400" spc="-1" strike="noStrike">
+            <a:endParaRPr b="0" lang="en-US" sz="4400" spc="-1" strike="noStrike">
               <a:latin typeface="Arial"/>
             </a:endParaRPr>
           </a:p>
@@ -951,7 +951,7 @@
         <p:spPr>
           <a:xfrm>
             <a:off x="504000" y="-11160"/>
-            <a:ext cx="9071280" cy="5851800"/>
+            <a:ext cx="9070920" cy="5851800"/>
           </a:xfrm>
           <a:prstGeom prst="rect">
             <a:avLst/>
@@ -963,7 +963,7 @@
           </a:bodyPr>
           <a:p>
             <a:pPr algn="ctr"/>
-            <a:endParaRPr b="0" lang="en-EG" sz="3200" spc="-1" strike="noStrike">
+            <a:endParaRPr b="0" lang="en-US" sz="3200" spc="-1" strike="noStrike">
               <a:latin typeface="Arial"/>
             </a:endParaRPr>
           </a:p>
@@ -1004,7 +1004,7 @@
         <p:spPr>
           <a:xfrm>
             <a:off x="504000" y="-11160"/>
-            <a:ext cx="9071280" cy="1262160"/>
+            <a:ext cx="9070920" cy="1262160"/>
           </a:xfrm>
           <a:prstGeom prst="rect">
             <a:avLst/>
@@ -1016,7 +1016,7 @@
           </a:bodyPr>
           <a:p>
             <a:pPr algn="ctr"/>
-            <a:endParaRPr b="0" lang="en-EG" sz="4400" spc="-1" strike="noStrike">
+            <a:endParaRPr b="0" lang="en-US" sz="4400" spc="-1" strike="noStrike">
               <a:latin typeface="Arial"/>
             </a:endParaRPr>
           </a:p>
@@ -1046,7 +1046,7 @@
             <a:normAutofit/>
           </a:bodyPr>
           <a:p>
-            <a:endParaRPr b="0" lang="en-EG" sz="3200" spc="-1" strike="noStrike">
+            <a:endParaRPr b="0" lang="en-US" sz="3200" spc="-1" strike="noStrike">
               <a:latin typeface="Arial"/>
             </a:endParaRPr>
           </a:p>
@@ -1076,7 +1076,7 @@
             <a:normAutofit/>
           </a:bodyPr>
           <a:p>
-            <a:endParaRPr b="0" lang="en-EG" sz="3200" spc="-1" strike="noStrike">
+            <a:endParaRPr b="0" lang="en-US" sz="3200" spc="-1" strike="noStrike">
               <a:latin typeface="Arial"/>
             </a:endParaRPr>
           </a:p>
@@ -1106,7 +1106,7 @@
             <a:normAutofit/>
           </a:bodyPr>
           <a:p>
-            <a:endParaRPr b="0" lang="en-EG" sz="3200" spc="-1" strike="noStrike">
+            <a:endParaRPr b="0" lang="en-US" sz="3200" spc="-1" strike="noStrike">
               <a:latin typeface="Arial"/>
             </a:endParaRPr>
           </a:p>
@@ -1147,7 +1147,7 @@
         <p:spPr>
           <a:xfrm>
             <a:off x="504000" y="-11160"/>
-            <a:ext cx="9071280" cy="1262160"/>
+            <a:ext cx="9070920" cy="1262160"/>
           </a:xfrm>
           <a:prstGeom prst="rect">
             <a:avLst/>
@@ -1159,7 +1159,7 @@
           </a:bodyPr>
           <a:p>
             <a:pPr algn="ctr"/>
-            <a:endParaRPr b="0" lang="en-EG" sz="4400" spc="-1" strike="noStrike">
+            <a:endParaRPr b="0" lang="en-US" sz="4400" spc="-1" strike="noStrike">
               <a:latin typeface="Arial"/>
             </a:endParaRPr>
           </a:p>
@@ -1190,7 +1190,7 @@
           </a:bodyPr>
           <a:p>
             <a:pPr algn="ctr"/>
-            <a:endParaRPr b="0" lang="en-EG" sz="3200" spc="-1" strike="noStrike">
+            <a:endParaRPr b="0" lang="en-US" sz="3200" spc="-1" strike="noStrike">
               <a:latin typeface="Arial"/>
             </a:endParaRPr>
           </a:p>
@@ -1231,7 +1231,7 @@
         <p:spPr>
           <a:xfrm>
             <a:off x="504000" y="-11160"/>
-            <a:ext cx="9071280" cy="1262160"/>
+            <a:ext cx="9070920" cy="1262160"/>
           </a:xfrm>
           <a:prstGeom prst="rect">
             <a:avLst/>
@@ -1243,7 +1243,7 @@
           </a:bodyPr>
           <a:p>
             <a:pPr algn="ctr"/>
-            <a:endParaRPr b="0" lang="en-EG" sz="4400" spc="-1" strike="noStrike">
+            <a:endParaRPr b="0" lang="en-US" sz="4400" spc="-1" strike="noStrike">
               <a:latin typeface="Arial"/>
             </a:endParaRPr>
           </a:p>
@@ -1273,7 +1273,7 @@
             <a:normAutofit/>
           </a:bodyPr>
           <a:p>
-            <a:endParaRPr b="0" lang="en-EG" sz="3200" spc="-1" strike="noStrike">
+            <a:endParaRPr b="0" lang="en-US" sz="3200" spc="-1" strike="noStrike">
               <a:latin typeface="Arial"/>
             </a:endParaRPr>
           </a:p>
@@ -1303,7 +1303,7 @@
             <a:normAutofit/>
           </a:bodyPr>
           <a:p>
-            <a:endParaRPr b="0" lang="en-EG" sz="3200" spc="-1" strike="noStrike">
+            <a:endParaRPr b="0" lang="en-US" sz="3200" spc="-1" strike="noStrike">
               <a:latin typeface="Arial"/>
             </a:endParaRPr>
           </a:p>
@@ -1333,7 +1333,7 @@
             <a:normAutofit/>
           </a:bodyPr>
           <a:p>
-            <a:endParaRPr b="0" lang="en-EG" sz="3200" spc="-1" strike="noStrike">
+            <a:endParaRPr b="0" lang="en-US" sz="3200" spc="-1" strike="noStrike">
               <a:latin typeface="Arial"/>
             </a:endParaRPr>
           </a:p>
@@ -1374,7 +1374,7 @@
         <p:spPr>
           <a:xfrm>
             <a:off x="504000" y="-11160"/>
-            <a:ext cx="9071280" cy="1262160"/>
+            <a:ext cx="9070920" cy="1262160"/>
           </a:xfrm>
           <a:prstGeom prst="rect">
             <a:avLst/>
@@ -1386,7 +1386,7 @@
           </a:bodyPr>
           <a:p>
             <a:pPr algn="ctr"/>
-            <a:endParaRPr b="0" lang="en-EG" sz="4400" spc="-1" strike="noStrike">
+            <a:endParaRPr b="0" lang="en-US" sz="4400" spc="-1" strike="noStrike">
               <a:latin typeface="Arial"/>
             </a:endParaRPr>
           </a:p>
@@ -1416,7 +1416,7 @@
             <a:normAutofit/>
           </a:bodyPr>
           <a:p>
-            <a:endParaRPr b="0" lang="en-EG" sz="3200" spc="-1" strike="noStrike">
+            <a:endParaRPr b="0" lang="en-US" sz="3200" spc="-1" strike="noStrike">
               <a:latin typeface="Arial"/>
             </a:endParaRPr>
           </a:p>
@@ -1446,7 +1446,7 @@
             <a:normAutofit/>
           </a:bodyPr>
           <a:p>
-            <a:endParaRPr b="0" lang="en-EG" sz="3200" spc="-1" strike="noStrike">
+            <a:endParaRPr b="0" lang="en-US" sz="3200" spc="-1" strike="noStrike">
               <a:latin typeface="Arial"/>
             </a:endParaRPr>
           </a:p>
@@ -1476,7 +1476,7 @@
             <a:normAutofit/>
           </a:bodyPr>
           <a:p>
-            <a:endParaRPr b="0" lang="en-EG" sz="3200" spc="-1" strike="noStrike">
+            <a:endParaRPr b="0" lang="en-US" sz="3200" spc="-1" strike="noStrike">
               <a:latin typeface="Arial"/>
             </a:endParaRPr>
           </a:p>
@@ -1517,7 +1517,7 @@
         <p:spPr>
           <a:xfrm>
             <a:off x="504000" y="-11160"/>
-            <a:ext cx="9071280" cy="1262160"/>
+            <a:ext cx="9070920" cy="1262160"/>
           </a:xfrm>
           <a:prstGeom prst="rect">
             <a:avLst/>
@@ -1529,7 +1529,7 @@
           </a:bodyPr>
           <a:p>
             <a:pPr algn="ctr"/>
-            <a:endParaRPr b="0" lang="en-EG" sz="4400" spc="-1" strike="noStrike">
+            <a:endParaRPr b="0" lang="en-US" sz="4400" spc="-1" strike="noStrike">
               <a:latin typeface="Arial"/>
             </a:endParaRPr>
           </a:p>
@@ -1559,7 +1559,7 @@
             <a:normAutofit/>
           </a:bodyPr>
           <a:p>
-            <a:endParaRPr b="0" lang="en-EG" sz="3200" spc="-1" strike="noStrike">
+            <a:endParaRPr b="0" lang="en-US" sz="3200" spc="-1" strike="noStrike">
               <a:latin typeface="Arial"/>
             </a:endParaRPr>
           </a:p>
@@ -1589,7 +1589,7 @@
             <a:normAutofit/>
           </a:bodyPr>
           <a:p>
-            <a:endParaRPr b="0" lang="en-EG" sz="3200" spc="-1" strike="noStrike">
+            <a:endParaRPr b="0" lang="en-US" sz="3200" spc="-1" strike="noStrike">
               <a:latin typeface="Arial"/>
             </a:endParaRPr>
           </a:p>
@@ -1630,7 +1630,7 @@
         <p:spPr>
           <a:xfrm>
             <a:off x="504000" y="-11160"/>
-            <a:ext cx="9071280" cy="1262160"/>
+            <a:ext cx="9070920" cy="1262160"/>
           </a:xfrm>
           <a:prstGeom prst="rect">
             <a:avLst/>
@@ -1642,7 +1642,7 @@
           </a:bodyPr>
           <a:p>
             <a:pPr algn="ctr"/>
-            <a:endParaRPr b="0" lang="en-EG" sz="4400" spc="-1" strike="noStrike">
+            <a:endParaRPr b="0" lang="en-US" sz="4400" spc="-1" strike="noStrike">
               <a:latin typeface="Arial"/>
             </a:endParaRPr>
           </a:p>
@@ -1672,7 +1672,7 @@
             <a:normAutofit/>
           </a:bodyPr>
           <a:p>
-            <a:endParaRPr b="0" lang="en-EG" sz="3200" spc="-1" strike="noStrike">
+            <a:endParaRPr b="0" lang="en-US" sz="3200" spc="-1" strike="noStrike">
               <a:latin typeface="Arial"/>
             </a:endParaRPr>
           </a:p>
@@ -1702,7 +1702,7 @@
             <a:normAutofit/>
           </a:bodyPr>
           <a:p>
-            <a:endParaRPr b="0" lang="en-EG" sz="3200" spc="-1" strike="noStrike">
+            <a:endParaRPr b="0" lang="en-US" sz="3200" spc="-1" strike="noStrike">
               <a:latin typeface="Arial"/>
             </a:endParaRPr>
           </a:p>
@@ -1732,7 +1732,7 @@
             <a:normAutofit/>
           </a:bodyPr>
           <a:p>
-            <a:endParaRPr b="0" lang="en-EG" sz="3200" spc="-1" strike="noStrike">
+            <a:endParaRPr b="0" lang="en-US" sz="3200" spc="-1" strike="noStrike">
               <a:latin typeface="Arial"/>
             </a:endParaRPr>
           </a:p>
@@ -1762,7 +1762,7 @@
             <a:normAutofit/>
           </a:bodyPr>
           <a:p>
-            <a:endParaRPr b="0" lang="en-EG" sz="3200" spc="-1" strike="noStrike">
+            <a:endParaRPr b="0" lang="en-US" sz="3200" spc="-1" strike="noStrike">
               <a:latin typeface="Arial"/>
             </a:endParaRPr>
           </a:p>
@@ -1803,7 +1803,7 @@
         <p:spPr>
           <a:xfrm>
             <a:off x="504000" y="-11160"/>
-            <a:ext cx="9071280" cy="1262160"/>
+            <a:ext cx="9070920" cy="1262160"/>
           </a:xfrm>
           <a:prstGeom prst="rect">
             <a:avLst/>
@@ -1815,7 +1815,7 @@
           </a:bodyPr>
           <a:p>
             <a:pPr algn="ctr"/>
-            <a:endParaRPr b="0" lang="en-EG" sz="4400" spc="-1" strike="noStrike">
+            <a:endParaRPr b="0" lang="en-US" sz="4400" spc="-1" strike="noStrike">
               <a:latin typeface="Arial"/>
             </a:endParaRPr>
           </a:p>
@@ -1845,7 +1845,7 @@
             <a:normAutofit/>
           </a:bodyPr>
           <a:p>
-            <a:endParaRPr b="0" lang="en-EG" sz="3200" spc="-1" strike="noStrike">
+            <a:endParaRPr b="0" lang="en-US" sz="3200" spc="-1" strike="noStrike">
               <a:latin typeface="Arial"/>
             </a:endParaRPr>
           </a:p>
@@ -1875,7 +1875,7 @@
             <a:normAutofit/>
           </a:bodyPr>
           <a:p>
-            <a:endParaRPr b="0" lang="en-EG" sz="3200" spc="-1" strike="noStrike">
+            <a:endParaRPr b="0" lang="en-US" sz="3200" spc="-1" strike="noStrike">
               <a:latin typeface="Arial"/>
             </a:endParaRPr>
           </a:p>
@@ -1905,7 +1905,7 @@
             <a:normAutofit/>
           </a:bodyPr>
           <a:p>
-            <a:endParaRPr b="0" lang="en-EG" sz="3200" spc="-1" strike="noStrike">
+            <a:endParaRPr b="0" lang="en-US" sz="3200" spc="-1" strike="noStrike">
               <a:latin typeface="Arial"/>
             </a:endParaRPr>
           </a:p>
@@ -1935,7 +1935,7 @@
             <a:normAutofit/>
           </a:bodyPr>
           <a:p>
-            <a:endParaRPr b="0" lang="en-EG" sz="3200" spc="-1" strike="noStrike">
+            <a:endParaRPr b="0" lang="en-US" sz="3200" spc="-1" strike="noStrike">
               <a:latin typeface="Arial"/>
             </a:endParaRPr>
           </a:p>
@@ -1965,7 +1965,7 @@
             <a:normAutofit/>
           </a:bodyPr>
           <a:p>
-            <a:endParaRPr b="0" lang="en-EG" sz="3200" spc="-1" strike="noStrike">
+            <a:endParaRPr b="0" lang="en-US" sz="3200" spc="-1" strike="noStrike">
               <a:latin typeface="Arial"/>
             </a:endParaRPr>
           </a:p>
@@ -1995,7 +1995,7 @@
             <a:normAutofit/>
           </a:bodyPr>
           <a:p>
-            <a:endParaRPr b="0" lang="en-EG" sz="3200" spc="-1" strike="noStrike">
+            <a:endParaRPr b="0" lang="en-US" sz="3200" spc="-1" strike="noStrike">
               <a:latin typeface="Arial"/>
             </a:endParaRPr>
           </a:p>
@@ -2058,7 +2058,7 @@
         <p:spPr>
           <a:xfrm>
             <a:off x="504000" y="-11160"/>
-            <a:ext cx="9071280" cy="1262160"/>
+            <a:ext cx="9070920" cy="1262160"/>
           </a:xfrm>
           <a:prstGeom prst="rect">
             <a:avLst/>
@@ -2070,7 +2070,7 @@
           </a:bodyPr>
           <a:p>
             <a:pPr algn="ctr"/>
-            <a:endParaRPr b="0" lang="en-EG" sz="4400" spc="-1" strike="noStrike">
+            <a:endParaRPr b="0" lang="en-US" sz="4400" spc="-1" strike="noStrike">
               <a:latin typeface="Arial"/>
             </a:endParaRPr>
           </a:p>
@@ -2101,7 +2101,7 @@
           </a:bodyPr>
           <a:p>
             <a:pPr algn="ctr"/>
-            <a:endParaRPr b="0" lang="en-EG" sz="3200" spc="-1" strike="noStrike">
+            <a:endParaRPr b="0" lang="en-US" sz="3200" spc="-1" strike="noStrike">
               <a:latin typeface="Arial"/>
             </a:endParaRPr>
           </a:p>
@@ -2142,7 +2142,7 @@
         <p:spPr>
           <a:xfrm>
             <a:off x="504000" y="-11160"/>
-            <a:ext cx="9071280" cy="1262160"/>
+            <a:ext cx="9070920" cy="1262160"/>
           </a:xfrm>
           <a:prstGeom prst="rect">
             <a:avLst/>
@@ -2154,7 +2154,7 @@
           </a:bodyPr>
           <a:p>
             <a:pPr algn="ctr"/>
-            <a:endParaRPr b="0" lang="en-EG" sz="4400" spc="-1" strike="noStrike">
+            <a:endParaRPr b="0" lang="en-US" sz="4400" spc="-1" strike="noStrike">
               <a:latin typeface="Arial"/>
             </a:endParaRPr>
           </a:p>
@@ -2184,7 +2184,7 @@
             <a:normAutofit/>
           </a:bodyPr>
           <a:p>
-            <a:endParaRPr b="0" lang="en-EG" sz="3200" spc="-1" strike="noStrike">
+            <a:endParaRPr b="0" lang="en-US" sz="3200" spc="-1" strike="noStrike">
               <a:latin typeface="Arial"/>
             </a:endParaRPr>
           </a:p>
@@ -2225,7 +2225,7 @@
         <p:spPr>
           <a:xfrm>
             <a:off x="504000" y="-11160"/>
-            <a:ext cx="9071280" cy="1262160"/>
+            <a:ext cx="9070920" cy="1262160"/>
           </a:xfrm>
           <a:prstGeom prst="rect">
             <a:avLst/>
@@ -2237,7 +2237,7 @@
           </a:bodyPr>
           <a:p>
             <a:pPr algn="ctr"/>
-            <a:endParaRPr b="0" lang="en-EG" sz="4400" spc="-1" strike="noStrike">
+            <a:endParaRPr b="0" lang="en-US" sz="4400" spc="-1" strike="noStrike">
               <a:latin typeface="Arial"/>
             </a:endParaRPr>
           </a:p>
@@ -2267,7 +2267,7 @@
             <a:normAutofit/>
           </a:bodyPr>
           <a:p>
-            <a:endParaRPr b="0" lang="en-EG" sz="3200" spc="-1" strike="noStrike">
+            <a:endParaRPr b="0" lang="en-US" sz="3200" spc="-1" strike="noStrike">
               <a:latin typeface="Arial"/>
             </a:endParaRPr>
           </a:p>
@@ -2297,7 +2297,7 @@
             <a:normAutofit/>
           </a:bodyPr>
           <a:p>
-            <a:endParaRPr b="0" lang="en-EG" sz="3200" spc="-1" strike="noStrike">
+            <a:endParaRPr b="0" lang="en-US" sz="3200" spc="-1" strike="noStrike">
               <a:latin typeface="Arial"/>
             </a:endParaRPr>
           </a:p>
@@ -2338,7 +2338,7 @@
         <p:spPr>
           <a:xfrm>
             <a:off x="504000" y="-11160"/>
-            <a:ext cx="9071280" cy="1262160"/>
+            <a:ext cx="9070920" cy="1262160"/>
           </a:xfrm>
           <a:prstGeom prst="rect">
             <a:avLst/>
@@ -2350,7 +2350,7 @@
           </a:bodyPr>
           <a:p>
             <a:pPr algn="ctr"/>
-            <a:endParaRPr b="0" lang="en-EG" sz="4400" spc="-1" strike="noStrike">
+            <a:endParaRPr b="0" lang="en-US" sz="4400" spc="-1" strike="noStrike">
               <a:latin typeface="Arial"/>
             </a:endParaRPr>
           </a:p>
@@ -2391,7 +2391,7 @@
         <p:spPr>
           <a:xfrm>
             <a:off x="504000" y="-11160"/>
-            <a:ext cx="9071280" cy="1262160"/>
+            <a:ext cx="9070920" cy="1262160"/>
           </a:xfrm>
           <a:prstGeom prst="rect">
             <a:avLst/>
@@ -2403,7 +2403,7 @@
           </a:bodyPr>
           <a:p>
             <a:pPr algn="ctr"/>
-            <a:endParaRPr b="0" lang="en-EG" sz="4400" spc="-1" strike="noStrike">
+            <a:endParaRPr b="0" lang="en-US" sz="4400" spc="-1" strike="noStrike">
               <a:latin typeface="Arial"/>
             </a:endParaRPr>
           </a:p>
@@ -2433,7 +2433,7 @@
             <a:normAutofit/>
           </a:bodyPr>
           <a:p>
-            <a:endParaRPr b="0" lang="en-EG" sz="3200" spc="-1" strike="noStrike">
+            <a:endParaRPr b="0" lang="en-US" sz="3200" spc="-1" strike="noStrike">
               <a:latin typeface="Arial"/>
             </a:endParaRPr>
           </a:p>
@@ -2474,7 +2474,7 @@
         <p:spPr>
           <a:xfrm>
             <a:off x="504000" y="-11160"/>
-            <a:ext cx="9071280" cy="5851800"/>
+            <a:ext cx="9070920" cy="5851800"/>
           </a:xfrm>
           <a:prstGeom prst="rect">
             <a:avLst/>
@@ -2486,7 +2486,7 @@
           </a:bodyPr>
           <a:p>
             <a:pPr algn="ctr"/>
-            <a:endParaRPr b="0" lang="en-EG" sz="3200" spc="-1" strike="noStrike">
+            <a:endParaRPr b="0" lang="en-US" sz="3200" spc="-1" strike="noStrike">
               <a:latin typeface="Arial"/>
             </a:endParaRPr>
           </a:p>
@@ -2527,7 +2527,7 @@
         <p:spPr>
           <a:xfrm>
             <a:off x="504000" y="-11160"/>
-            <a:ext cx="9071280" cy="1262160"/>
+            <a:ext cx="9070920" cy="1262160"/>
           </a:xfrm>
           <a:prstGeom prst="rect">
             <a:avLst/>
@@ -2539,7 +2539,7 @@
           </a:bodyPr>
           <a:p>
             <a:pPr algn="ctr"/>
-            <a:endParaRPr b="0" lang="en-EG" sz="4400" spc="-1" strike="noStrike">
+            <a:endParaRPr b="0" lang="en-US" sz="4400" spc="-1" strike="noStrike">
               <a:latin typeface="Arial"/>
             </a:endParaRPr>
           </a:p>
@@ -2569,7 +2569,7 @@
             <a:normAutofit/>
           </a:bodyPr>
           <a:p>
-            <a:endParaRPr b="0" lang="en-EG" sz="3200" spc="-1" strike="noStrike">
+            <a:endParaRPr b="0" lang="en-US" sz="3200" spc="-1" strike="noStrike">
               <a:latin typeface="Arial"/>
             </a:endParaRPr>
           </a:p>
@@ -2599,7 +2599,7 @@
             <a:normAutofit/>
           </a:bodyPr>
           <a:p>
-            <a:endParaRPr b="0" lang="en-EG" sz="3200" spc="-1" strike="noStrike">
+            <a:endParaRPr b="0" lang="en-US" sz="3200" spc="-1" strike="noStrike">
               <a:latin typeface="Arial"/>
             </a:endParaRPr>
           </a:p>
@@ -2629,7 +2629,7 @@
             <a:normAutofit/>
           </a:bodyPr>
           <a:p>
-            <a:endParaRPr b="0" lang="en-EG" sz="3200" spc="-1" strike="noStrike">
+            <a:endParaRPr b="0" lang="en-US" sz="3200" spc="-1" strike="noStrike">
               <a:latin typeface="Arial"/>
             </a:endParaRPr>
           </a:p>
@@ -2670,7 +2670,7 @@
         <p:spPr>
           <a:xfrm>
             <a:off x="504000" y="-11160"/>
-            <a:ext cx="9071280" cy="1262160"/>
+            <a:ext cx="9070920" cy="1262160"/>
           </a:xfrm>
           <a:prstGeom prst="rect">
             <a:avLst/>
@@ -2682,7 +2682,7 @@
           </a:bodyPr>
           <a:p>
             <a:pPr algn="ctr"/>
-            <a:endParaRPr b="0" lang="en-EG" sz="4400" spc="-1" strike="noStrike">
+            <a:endParaRPr b="0" lang="en-US" sz="4400" spc="-1" strike="noStrike">
               <a:latin typeface="Arial"/>
             </a:endParaRPr>
           </a:p>
@@ -2712,7 +2712,7 @@
             <a:normAutofit/>
           </a:bodyPr>
           <a:p>
-            <a:endParaRPr b="0" lang="en-EG" sz="3200" spc="-1" strike="noStrike">
+            <a:endParaRPr b="0" lang="en-US" sz="3200" spc="-1" strike="noStrike">
               <a:latin typeface="Arial"/>
             </a:endParaRPr>
           </a:p>
@@ -2742,7 +2742,7 @@
             <a:normAutofit/>
           </a:bodyPr>
           <a:p>
-            <a:endParaRPr b="0" lang="en-EG" sz="3200" spc="-1" strike="noStrike">
+            <a:endParaRPr b="0" lang="en-US" sz="3200" spc="-1" strike="noStrike">
               <a:latin typeface="Arial"/>
             </a:endParaRPr>
           </a:p>
@@ -2772,7 +2772,7 @@
             <a:normAutofit/>
           </a:bodyPr>
           <a:p>
-            <a:endParaRPr b="0" lang="en-EG" sz="3200" spc="-1" strike="noStrike">
+            <a:endParaRPr b="0" lang="en-US" sz="3200" spc="-1" strike="noStrike">
               <a:latin typeface="Arial"/>
             </a:endParaRPr>
           </a:p>
@@ -2813,7 +2813,7 @@
         <p:spPr>
           <a:xfrm>
             <a:off x="504000" y="-11160"/>
-            <a:ext cx="9071280" cy="1262160"/>
+            <a:ext cx="9070920" cy="1262160"/>
           </a:xfrm>
           <a:prstGeom prst="rect">
             <a:avLst/>
@@ -2825,7 +2825,7 @@
           </a:bodyPr>
           <a:p>
             <a:pPr algn="ctr"/>
-            <a:endParaRPr b="0" lang="en-EG" sz="4400" spc="-1" strike="noStrike">
+            <a:endParaRPr b="0" lang="en-US" sz="4400" spc="-1" strike="noStrike">
               <a:latin typeface="Arial"/>
             </a:endParaRPr>
           </a:p>
@@ -2855,7 +2855,7 @@
             <a:normAutofit/>
           </a:bodyPr>
           <a:p>
-            <a:endParaRPr b="0" lang="en-EG" sz="3200" spc="-1" strike="noStrike">
+            <a:endParaRPr b="0" lang="en-US" sz="3200" spc="-1" strike="noStrike">
               <a:latin typeface="Arial"/>
             </a:endParaRPr>
           </a:p>
@@ -2885,7 +2885,7 @@
             <a:normAutofit/>
           </a:bodyPr>
           <a:p>
-            <a:endParaRPr b="0" lang="en-EG" sz="3200" spc="-1" strike="noStrike">
+            <a:endParaRPr b="0" lang="en-US" sz="3200" spc="-1" strike="noStrike">
               <a:latin typeface="Arial"/>
             </a:endParaRPr>
           </a:p>
@@ -2915,7 +2915,7 @@
             <a:normAutofit/>
           </a:bodyPr>
           <a:p>
-            <a:endParaRPr b="0" lang="en-EG" sz="3200" spc="-1" strike="noStrike">
+            <a:endParaRPr b="0" lang="en-US" sz="3200" spc="-1" strike="noStrike">
               <a:latin typeface="Arial"/>
             </a:endParaRPr>
           </a:p>
@@ -2956,7 +2956,7 @@
         <p:spPr>
           <a:xfrm>
             <a:off x="504000" y="-11160"/>
-            <a:ext cx="9071280" cy="1262160"/>
+            <a:ext cx="9070920" cy="1262160"/>
           </a:xfrm>
           <a:prstGeom prst="rect">
             <a:avLst/>
@@ -2968,7 +2968,7 @@
           </a:bodyPr>
           <a:p>
             <a:pPr algn="ctr"/>
-            <a:endParaRPr b="0" lang="en-EG" sz="4400" spc="-1" strike="noStrike">
+            <a:endParaRPr b="0" lang="en-US" sz="4400" spc="-1" strike="noStrike">
               <a:latin typeface="Arial"/>
             </a:endParaRPr>
           </a:p>
@@ -2998,7 +2998,7 @@
             <a:normAutofit/>
           </a:bodyPr>
           <a:p>
-            <a:endParaRPr b="0" lang="en-EG" sz="3200" spc="-1" strike="noStrike">
+            <a:endParaRPr b="0" lang="en-US" sz="3200" spc="-1" strike="noStrike">
               <a:latin typeface="Arial"/>
             </a:endParaRPr>
           </a:p>
@@ -3028,7 +3028,7 @@
             <a:normAutofit/>
           </a:bodyPr>
           <a:p>
-            <a:endParaRPr b="0" lang="en-EG" sz="3200" spc="-1" strike="noStrike">
+            <a:endParaRPr b="0" lang="en-US" sz="3200" spc="-1" strike="noStrike">
               <a:latin typeface="Arial"/>
             </a:endParaRPr>
           </a:p>
@@ -3069,7 +3069,7 @@
         <p:spPr>
           <a:xfrm>
             <a:off x="504000" y="-11160"/>
-            <a:ext cx="9071280" cy="1262160"/>
+            <a:ext cx="9070920" cy="1262160"/>
           </a:xfrm>
           <a:prstGeom prst="rect">
             <a:avLst/>
@@ -3081,7 +3081,7 @@
           </a:bodyPr>
           <a:p>
             <a:pPr algn="ctr"/>
-            <a:endParaRPr b="0" lang="en-EG" sz="4400" spc="-1" strike="noStrike">
+            <a:endParaRPr b="0" lang="en-US" sz="4400" spc="-1" strike="noStrike">
               <a:latin typeface="Arial"/>
             </a:endParaRPr>
           </a:p>
@@ -3111,7 +3111,7 @@
             <a:normAutofit/>
           </a:bodyPr>
           <a:p>
-            <a:endParaRPr b="0" lang="en-EG" sz="3200" spc="-1" strike="noStrike">
+            <a:endParaRPr b="0" lang="en-US" sz="3200" spc="-1" strike="noStrike">
               <a:latin typeface="Arial"/>
             </a:endParaRPr>
           </a:p>
@@ -3141,7 +3141,7 @@
             <a:normAutofit/>
           </a:bodyPr>
           <a:p>
-            <a:endParaRPr b="0" lang="en-EG" sz="3200" spc="-1" strike="noStrike">
+            <a:endParaRPr b="0" lang="en-US" sz="3200" spc="-1" strike="noStrike">
               <a:latin typeface="Arial"/>
             </a:endParaRPr>
           </a:p>
@@ -3171,7 +3171,7 @@
             <a:normAutofit/>
           </a:bodyPr>
           <a:p>
-            <a:endParaRPr b="0" lang="en-EG" sz="3200" spc="-1" strike="noStrike">
+            <a:endParaRPr b="0" lang="en-US" sz="3200" spc="-1" strike="noStrike">
               <a:latin typeface="Arial"/>
             </a:endParaRPr>
           </a:p>
@@ -3201,7 +3201,7 @@
             <a:normAutofit/>
           </a:bodyPr>
           <a:p>
-            <a:endParaRPr b="0" lang="en-EG" sz="3200" spc="-1" strike="noStrike">
+            <a:endParaRPr b="0" lang="en-US" sz="3200" spc="-1" strike="noStrike">
               <a:latin typeface="Arial"/>
             </a:endParaRPr>
           </a:p>
@@ -3242,7 +3242,7 @@
         <p:spPr>
           <a:xfrm>
             <a:off x="504000" y="-11160"/>
-            <a:ext cx="9071280" cy="1262160"/>
+            <a:ext cx="9070920" cy="1262160"/>
           </a:xfrm>
           <a:prstGeom prst="rect">
             <a:avLst/>
@@ -3254,7 +3254,7 @@
           </a:bodyPr>
           <a:p>
             <a:pPr algn="ctr"/>
-            <a:endParaRPr b="0" lang="en-EG" sz="4400" spc="-1" strike="noStrike">
+            <a:endParaRPr b="0" lang="en-US" sz="4400" spc="-1" strike="noStrike">
               <a:latin typeface="Arial"/>
             </a:endParaRPr>
           </a:p>
@@ -3284,7 +3284,7 @@
             <a:normAutofit/>
           </a:bodyPr>
           <a:p>
-            <a:endParaRPr b="0" lang="en-EG" sz="3200" spc="-1" strike="noStrike">
+            <a:endParaRPr b="0" lang="en-US" sz="3200" spc="-1" strike="noStrike">
               <a:latin typeface="Arial"/>
             </a:endParaRPr>
           </a:p>
@@ -3314,7 +3314,7 @@
             <a:normAutofit/>
           </a:bodyPr>
           <a:p>
-            <a:endParaRPr b="0" lang="en-EG" sz="3200" spc="-1" strike="noStrike">
+            <a:endParaRPr b="0" lang="en-US" sz="3200" spc="-1" strike="noStrike">
               <a:latin typeface="Arial"/>
             </a:endParaRPr>
           </a:p>
@@ -3344,7 +3344,7 @@
             <a:normAutofit/>
           </a:bodyPr>
           <a:p>
-            <a:endParaRPr b="0" lang="en-EG" sz="3200" spc="-1" strike="noStrike">
+            <a:endParaRPr b="0" lang="en-US" sz="3200" spc="-1" strike="noStrike">
               <a:latin typeface="Arial"/>
             </a:endParaRPr>
           </a:p>
@@ -3374,7 +3374,7 @@
             <a:normAutofit/>
           </a:bodyPr>
           <a:p>
-            <a:endParaRPr b="0" lang="en-EG" sz="3200" spc="-1" strike="noStrike">
+            <a:endParaRPr b="0" lang="en-US" sz="3200" spc="-1" strike="noStrike">
               <a:latin typeface="Arial"/>
             </a:endParaRPr>
           </a:p>
@@ -3404,7 +3404,7 @@
             <a:normAutofit/>
           </a:bodyPr>
           <a:p>
-            <a:endParaRPr b="0" lang="en-EG" sz="3200" spc="-1" strike="noStrike">
+            <a:endParaRPr b="0" lang="en-US" sz="3200" spc="-1" strike="noStrike">
               <a:latin typeface="Arial"/>
             </a:endParaRPr>
           </a:p>
@@ -3434,7 +3434,7 @@
             <a:normAutofit/>
           </a:bodyPr>
           <a:p>
-            <a:endParaRPr b="0" lang="en-EG" sz="3200" spc="-1" strike="noStrike">
+            <a:endParaRPr b="0" lang="en-US" sz="3200" spc="-1" strike="noStrike">
               <a:latin typeface="Arial"/>
             </a:endParaRPr>
           </a:p>
@@ -3475,7 +3475,7 @@
         <p:spPr>
           <a:xfrm>
             <a:off x="504000" y="-11160"/>
-            <a:ext cx="9071280" cy="1262160"/>
+            <a:ext cx="9070920" cy="1262160"/>
           </a:xfrm>
           <a:prstGeom prst="rect">
             <a:avLst/>
@@ -3487,7 +3487,7 @@
           </a:bodyPr>
           <a:p>
             <a:pPr algn="ctr"/>
-            <a:endParaRPr b="0" lang="en-EG" sz="4400" spc="-1" strike="noStrike">
+            <a:endParaRPr b="0" lang="en-US" sz="4400" spc="-1" strike="noStrike">
               <a:latin typeface="Arial"/>
             </a:endParaRPr>
           </a:p>
@@ -3517,7 +3517,7 @@
             <a:normAutofit/>
           </a:bodyPr>
           <a:p>
-            <a:endParaRPr b="0" lang="en-EG" sz="3200" spc="-1" strike="noStrike">
+            <a:endParaRPr b="0" lang="en-US" sz="3200" spc="-1" strike="noStrike">
               <a:latin typeface="Arial"/>
             </a:endParaRPr>
           </a:p>
@@ -3547,7 +3547,7 @@
             <a:normAutofit/>
           </a:bodyPr>
           <a:p>
-            <a:endParaRPr b="0" lang="en-EG" sz="3200" spc="-1" strike="noStrike">
+            <a:endParaRPr b="0" lang="en-US" sz="3200" spc="-1" strike="noStrike">
               <a:latin typeface="Arial"/>
             </a:endParaRPr>
           </a:p>
@@ -3588,7 +3588,7 @@
         <p:spPr>
           <a:xfrm>
             <a:off x="504000" y="-11160"/>
-            <a:ext cx="9071280" cy="1262160"/>
+            <a:ext cx="9070920" cy="1262160"/>
           </a:xfrm>
           <a:prstGeom prst="rect">
             <a:avLst/>
@@ -3600,7 +3600,7 @@
           </a:bodyPr>
           <a:p>
             <a:pPr algn="ctr"/>
-            <a:endParaRPr b="0" lang="en-EG" sz="4400" spc="-1" strike="noStrike">
+            <a:endParaRPr b="0" lang="en-US" sz="4400" spc="-1" strike="noStrike">
               <a:latin typeface="Arial"/>
             </a:endParaRPr>
           </a:p>
@@ -3641,7 +3641,7 @@
         <p:spPr>
           <a:xfrm>
             <a:off x="504000" y="-11160"/>
-            <a:ext cx="9071280" cy="5851800"/>
+            <a:ext cx="9070920" cy="5851800"/>
           </a:xfrm>
           <a:prstGeom prst="rect">
             <a:avLst/>
@@ -3653,7 +3653,7 @@
           </a:bodyPr>
           <a:p>
             <a:pPr algn="ctr"/>
-            <a:endParaRPr b="0" lang="en-EG" sz="3200" spc="-1" strike="noStrike">
+            <a:endParaRPr b="0" lang="en-US" sz="3200" spc="-1" strike="noStrike">
               <a:latin typeface="Arial"/>
             </a:endParaRPr>
           </a:p>
@@ -3694,7 +3694,7 @@
         <p:spPr>
           <a:xfrm>
             <a:off x="504000" y="-11160"/>
-            <a:ext cx="9071280" cy="1262160"/>
+            <a:ext cx="9070920" cy="1262160"/>
           </a:xfrm>
           <a:prstGeom prst="rect">
             <a:avLst/>
@@ -3706,7 +3706,7 @@
           </a:bodyPr>
           <a:p>
             <a:pPr algn="ctr"/>
-            <a:endParaRPr b="0" lang="en-EG" sz="4400" spc="-1" strike="noStrike">
+            <a:endParaRPr b="0" lang="en-US" sz="4400" spc="-1" strike="noStrike">
               <a:latin typeface="Arial"/>
             </a:endParaRPr>
           </a:p>
@@ -3736,7 +3736,7 @@
             <a:normAutofit/>
           </a:bodyPr>
           <a:p>
-            <a:endParaRPr b="0" lang="en-EG" sz="3200" spc="-1" strike="noStrike">
+            <a:endParaRPr b="0" lang="en-US" sz="3200" spc="-1" strike="noStrike">
               <a:latin typeface="Arial"/>
             </a:endParaRPr>
           </a:p>
@@ -3766,7 +3766,7 @@
             <a:normAutofit/>
           </a:bodyPr>
           <a:p>
-            <a:endParaRPr b="0" lang="en-EG" sz="3200" spc="-1" strike="noStrike">
+            <a:endParaRPr b="0" lang="en-US" sz="3200" spc="-1" strike="noStrike">
               <a:latin typeface="Arial"/>
             </a:endParaRPr>
           </a:p>
@@ -3796,7 +3796,7 @@
             <a:normAutofit/>
           </a:bodyPr>
           <a:p>
-            <a:endParaRPr b="0" lang="en-EG" sz="3200" spc="-1" strike="noStrike">
+            <a:endParaRPr b="0" lang="en-US" sz="3200" spc="-1" strike="noStrike">
               <a:latin typeface="Arial"/>
             </a:endParaRPr>
           </a:p>
@@ -3837,7 +3837,7 @@
         <p:spPr>
           <a:xfrm>
             <a:off x="504000" y="-11160"/>
-            <a:ext cx="9071280" cy="1262160"/>
+            <a:ext cx="9070920" cy="1262160"/>
           </a:xfrm>
           <a:prstGeom prst="rect">
             <a:avLst/>
@@ -3849,7 +3849,7 @@
           </a:bodyPr>
           <a:p>
             <a:pPr algn="ctr"/>
-            <a:endParaRPr b="0" lang="en-EG" sz="4400" spc="-1" strike="noStrike">
+            <a:endParaRPr b="0" lang="en-US" sz="4400" spc="-1" strike="noStrike">
               <a:latin typeface="Arial"/>
             </a:endParaRPr>
           </a:p>
@@ -3879,7 +3879,7 @@
             <a:normAutofit/>
           </a:bodyPr>
           <a:p>
-            <a:endParaRPr b="0" lang="en-EG" sz="3200" spc="-1" strike="noStrike">
+            <a:endParaRPr b="0" lang="en-US" sz="3200" spc="-1" strike="noStrike">
               <a:latin typeface="Arial"/>
             </a:endParaRPr>
           </a:p>
@@ -3909,7 +3909,7 @@
             <a:normAutofit/>
           </a:bodyPr>
           <a:p>
-            <a:endParaRPr b="0" lang="en-EG" sz="3200" spc="-1" strike="noStrike">
+            <a:endParaRPr b="0" lang="en-US" sz="3200" spc="-1" strike="noStrike">
               <a:latin typeface="Arial"/>
             </a:endParaRPr>
           </a:p>
@@ -3939,7 +3939,7 @@
             <a:normAutofit/>
           </a:bodyPr>
           <a:p>
-            <a:endParaRPr b="0" lang="en-EG" sz="3200" spc="-1" strike="noStrike">
+            <a:endParaRPr b="0" lang="en-US" sz="3200" spc="-1" strike="noStrike">
               <a:latin typeface="Arial"/>
             </a:endParaRPr>
           </a:p>
@@ -3980,7 +3980,7 @@
         <p:spPr>
           <a:xfrm>
             <a:off x="504000" y="-11160"/>
-            <a:ext cx="9071280" cy="1262160"/>
+            <a:ext cx="9070920" cy="1262160"/>
           </a:xfrm>
           <a:prstGeom prst="rect">
             <a:avLst/>
@@ -3992,7 +3992,7 @@
           </a:bodyPr>
           <a:p>
             <a:pPr algn="ctr"/>
-            <a:endParaRPr b="0" lang="en-EG" sz="4400" spc="-1" strike="noStrike">
+            <a:endParaRPr b="0" lang="en-US" sz="4400" spc="-1" strike="noStrike">
               <a:latin typeface="Arial"/>
             </a:endParaRPr>
           </a:p>
@@ -4022,7 +4022,7 @@
             <a:normAutofit/>
           </a:bodyPr>
           <a:p>
-            <a:endParaRPr b="0" lang="en-EG" sz="3200" spc="-1" strike="noStrike">
+            <a:endParaRPr b="0" lang="en-US" sz="3200" spc="-1" strike="noStrike">
               <a:latin typeface="Arial"/>
             </a:endParaRPr>
           </a:p>
@@ -4052,7 +4052,7 @@
             <a:normAutofit/>
           </a:bodyPr>
           <a:p>
-            <a:endParaRPr b="0" lang="en-EG" sz="3200" spc="-1" strike="noStrike">
+            <a:endParaRPr b="0" lang="en-US" sz="3200" spc="-1" strike="noStrike">
               <a:latin typeface="Arial"/>
             </a:endParaRPr>
           </a:p>
@@ -4082,7 +4082,7 @@
             <a:normAutofit/>
           </a:bodyPr>
           <a:p>
-            <a:endParaRPr b="0" lang="en-EG" sz="3200" spc="-1" strike="noStrike">
+            <a:endParaRPr b="0" lang="en-US" sz="3200" spc="-1" strike="noStrike">
               <a:latin typeface="Arial"/>
             </a:endParaRPr>
           </a:p>
@@ -4123,7 +4123,7 @@
         <p:spPr>
           <a:xfrm>
             <a:off x="0" y="5806440"/>
-            <a:ext cx="10079280" cy="1753920"/>
+            <a:ext cx="10078920" cy="1753560"/>
           </a:xfrm>
           <a:prstGeom prst="rect">
             <a:avLst/>
@@ -4146,7 +4146,7 @@
         <p:spPr>
           <a:xfrm>
             <a:off x="504000" y="-11160"/>
-            <a:ext cx="9071280" cy="1262160"/>
+            <a:ext cx="9070920" cy="1262160"/>
           </a:xfrm>
           <a:prstGeom prst="rect">
             <a:avLst/>
@@ -4158,12 +4158,12 @@
           </a:bodyPr>
           <a:p>
             <a:r>
-              <a:rPr b="0" lang="en-EG" sz="1800" spc="-1" strike="noStrike">
+              <a:rPr b="0" lang="en-US" sz="1800" spc="-1" strike="noStrike">
                 <a:latin typeface="Arial"/>
               </a:rPr>
               <a:t>Click to edit the title text format</a:t>
             </a:r>
-            <a:endParaRPr b="0" lang="en-EG" sz="1800" spc="-1" strike="noStrike">
+            <a:endParaRPr b="0" lang="en-US" sz="1800" spc="-1" strike="noStrike">
               <a:latin typeface="Arial"/>
             </a:endParaRPr>
           </a:p>
@@ -4205,12 +4205,12 @@
               <a:buChar char=""/>
             </a:pPr>
             <a:r>
-              <a:rPr b="0" lang="en-EG" sz="3200" spc="-1" strike="noStrike">
+              <a:rPr b="0" lang="en-US" sz="3200" spc="-1" strike="noStrike">
                 <a:latin typeface="Arial"/>
               </a:rPr>
               <a:t>Click to edit the outline text format</a:t>
             </a:r>
-            <a:endParaRPr b="0" lang="en-EG" sz="3200" spc="-1" strike="noStrike">
+            <a:endParaRPr b="0" lang="en-US" sz="3200" spc="-1" strike="noStrike">
               <a:latin typeface="Arial"/>
             </a:endParaRPr>
           </a:p>
@@ -4227,12 +4227,12 @@
               <a:buChar char=""/>
             </a:pPr>
             <a:r>
-              <a:rPr b="0" lang="en-EG" sz="2800" spc="-1" strike="noStrike">
+              <a:rPr b="0" lang="en-US" sz="2800" spc="-1" strike="noStrike">
                 <a:latin typeface="Arial"/>
               </a:rPr>
               <a:t>Second Outline Level</a:t>
             </a:r>
-            <a:endParaRPr b="0" lang="en-EG" sz="2800" spc="-1" strike="noStrike">
+            <a:endParaRPr b="0" lang="en-US" sz="2800" spc="-1" strike="noStrike">
               <a:latin typeface="Arial"/>
             </a:endParaRPr>
           </a:p>
@@ -4249,12 +4249,12 @@
               <a:buChar char=""/>
             </a:pPr>
             <a:r>
-              <a:rPr b="0" lang="en-EG" sz="2400" spc="-1" strike="noStrike">
+              <a:rPr b="0" lang="en-US" sz="2400" spc="-1" strike="noStrike">
                 <a:latin typeface="Arial"/>
               </a:rPr>
               <a:t>Third Outline Level</a:t>
             </a:r>
-            <a:endParaRPr b="0" lang="en-EG" sz="2400" spc="-1" strike="noStrike">
+            <a:endParaRPr b="0" lang="en-US" sz="2400" spc="-1" strike="noStrike">
               <a:latin typeface="Arial"/>
             </a:endParaRPr>
           </a:p>
@@ -4271,12 +4271,12 @@
               <a:buChar char=""/>
             </a:pPr>
             <a:r>
-              <a:rPr b="0" lang="en-EG" sz="2000" spc="-1" strike="noStrike">
+              <a:rPr b="0" lang="en-US" sz="2000" spc="-1" strike="noStrike">
                 <a:latin typeface="Arial"/>
               </a:rPr>
               <a:t>Fourth Outline Level</a:t>
             </a:r>
-            <a:endParaRPr b="0" lang="en-EG" sz="2000" spc="-1" strike="noStrike">
+            <a:endParaRPr b="0" lang="en-US" sz="2000" spc="-1" strike="noStrike">
               <a:latin typeface="Arial"/>
             </a:endParaRPr>
           </a:p>
@@ -4293,12 +4293,12 @@
               <a:buChar char=""/>
             </a:pPr>
             <a:r>
-              <a:rPr b="0" lang="en-EG" sz="2000" spc="-1" strike="noStrike">
+              <a:rPr b="0" lang="en-US" sz="2000" spc="-1" strike="noStrike">
                 <a:latin typeface="Arial"/>
               </a:rPr>
               <a:t>Fifth Outline Level</a:t>
             </a:r>
-            <a:endParaRPr b="0" lang="en-EG" sz="2000" spc="-1" strike="noStrike">
+            <a:endParaRPr b="0" lang="en-US" sz="2000" spc="-1" strike="noStrike">
               <a:latin typeface="Arial"/>
             </a:endParaRPr>
           </a:p>
@@ -4315,12 +4315,12 @@
               <a:buChar char=""/>
             </a:pPr>
             <a:r>
-              <a:rPr b="0" lang="en-EG" sz="2000" spc="-1" strike="noStrike">
+              <a:rPr b="0" lang="en-US" sz="2000" spc="-1" strike="noStrike">
                 <a:latin typeface="Arial"/>
               </a:rPr>
               <a:t>Sixth Outline Level</a:t>
             </a:r>
-            <a:endParaRPr b="0" lang="en-EG" sz="2000" spc="-1" strike="noStrike">
+            <a:endParaRPr b="0" lang="en-US" sz="2000" spc="-1" strike="noStrike">
               <a:latin typeface="Arial"/>
             </a:endParaRPr>
           </a:p>
@@ -4337,12 +4337,12 @@
               <a:buChar char=""/>
             </a:pPr>
             <a:r>
-              <a:rPr b="0" lang="en-EG" sz="2000" spc="-1" strike="noStrike">
+              <a:rPr b="0" lang="en-US" sz="2000" spc="-1" strike="noStrike">
                 <a:latin typeface="Arial"/>
               </a:rPr>
               <a:t>Seventh Outline Level</a:t>
             </a:r>
-            <a:endParaRPr b="0" lang="en-EG" sz="2000" spc="-1" strike="noStrike">
+            <a:endParaRPr b="0" lang="en-US" sz="2000" spc="-1" strike="noStrike">
               <a:latin typeface="Arial"/>
             </a:endParaRPr>
           </a:p>
@@ -4394,7 +4394,7 @@
         <p:spPr>
           <a:xfrm>
             <a:off x="0" y="0"/>
-            <a:ext cx="10076400" cy="941400"/>
+            <a:ext cx="10076040" cy="941040"/>
           </a:xfrm>
           <a:prstGeom prst="rect">
             <a:avLst/>
@@ -4430,7 +4430,7 @@
         <p:spPr>
           <a:xfrm>
             <a:off x="0" y="6620400"/>
-            <a:ext cx="10076400" cy="941400"/>
+            <a:ext cx="10076040" cy="941040"/>
           </a:xfrm>
           <a:prstGeom prst="rect">
             <a:avLst/>
@@ -4469,8 +4469,8 @@
         </p:nvSpPr>
         <p:spPr>
           <a:xfrm>
-            <a:off x="504000" y="-11160"/>
-            <a:ext cx="9071280" cy="1262160"/>
+            <a:off x="504000" y="301320"/>
+            <a:ext cx="9072000" cy="1261800"/>
           </a:xfrm>
           <a:prstGeom prst="rect">
             <a:avLst/>
@@ -4478,16 +4478,17 @@
         </p:spPr>
         <p:txBody>
           <a:bodyPr lIns="0" rIns="0" tIns="0" bIns="0" anchor="ctr">
-            <a:spAutoFit/>
-          </a:bodyPr>
-          <a:p>
+            <a:noAutofit/>
+          </a:bodyPr>
+          <a:p>
+            <a:pPr algn="ctr"/>
             <a:r>
-              <a:rPr b="0" lang="en-EG" sz="1800" spc="-1" strike="noStrike">
+              <a:rPr b="0" lang="en-US" sz="4400" spc="-1" strike="noStrike">
                 <a:latin typeface="Arial"/>
               </a:rPr>
               <a:t>Click to edit the title text format</a:t>
             </a:r>
-            <a:endParaRPr b="0" lang="en-EG" sz="1800" spc="-1" strike="noStrike">
+            <a:endParaRPr b="0" lang="en-US" sz="4400" spc="-1" strike="noStrike">
               <a:latin typeface="Arial"/>
             </a:endParaRPr>
           </a:p>
@@ -4505,16 +4506,16 @@
         </p:nvSpPr>
         <p:spPr>
           <a:xfrm>
-            <a:off x="504000" y="1769040"/>
-            <a:ext cx="9071280" cy="4384080"/>
-          </a:xfrm>
-          <a:prstGeom prst="rect">
-            <a:avLst/>
-          </a:prstGeom>
-        </p:spPr>
-        <p:txBody>
-          <a:bodyPr lIns="0" rIns="0" tIns="0" bIns="0">
-            <a:noAutofit/>
+            <a:off x="504000" y="1768680"/>
+            <a:ext cx="9072000" cy="4384080"/>
+          </a:xfrm>
+          <a:prstGeom prst="rect">
+            <a:avLst/>
+          </a:prstGeom>
+        </p:spPr>
+        <p:txBody>
+          <a:bodyPr lIns="0" rIns="0" tIns="0" bIns="0">
+            <a:normAutofit/>
           </a:bodyPr>
           <a:p>
             <a:pPr marL="432000" indent="-324000">
@@ -4529,12 +4530,12 @@
               <a:buChar char=""/>
             </a:pPr>
             <a:r>
-              <a:rPr b="0" lang="en-EG" sz="1800" spc="-1" strike="noStrike">
+              <a:rPr b="0" lang="en-US" sz="3200" spc="-1" strike="noStrike">
                 <a:latin typeface="Arial"/>
               </a:rPr>
               <a:t>Click to edit the outline text format</a:t>
             </a:r>
-            <a:endParaRPr b="0" lang="en-EG" sz="1800" spc="-1" strike="noStrike">
+            <a:endParaRPr b="0" lang="en-US" sz="3200" spc="-1" strike="noStrike">
               <a:latin typeface="Arial"/>
             </a:endParaRPr>
           </a:p>
@@ -4551,12 +4552,12 @@
               <a:buChar char=""/>
             </a:pPr>
             <a:r>
-              <a:rPr b="0" lang="en-EG" sz="1800" spc="-1" strike="noStrike">
+              <a:rPr b="0" lang="en-US" sz="2800" spc="-1" strike="noStrike">
                 <a:latin typeface="Arial"/>
               </a:rPr>
               <a:t>Second Outline Level</a:t>
             </a:r>
-            <a:endParaRPr b="0" lang="en-EG" sz="1800" spc="-1" strike="noStrike">
+            <a:endParaRPr b="0" lang="en-US" sz="2800" spc="-1" strike="noStrike">
               <a:latin typeface="Arial"/>
             </a:endParaRPr>
           </a:p>
@@ -4573,12 +4574,12 @@
               <a:buChar char=""/>
             </a:pPr>
             <a:r>
-              <a:rPr b="0" lang="en-EG" sz="1800" spc="-1" strike="noStrike">
+              <a:rPr b="0" lang="en-US" sz="2400" spc="-1" strike="noStrike">
                 <a:latin typeface="Arial"/>
               </a:rPr>
               <a:t>Third Outline Level</a:t>
             </a:r>
-            <a:endParaRPr b="0" lang="en-EG" sz="1800" spc="-1" strike="noStrike">
+            <a:endParaRPr b="0" lang="en-US" sz="2400" spc="-1" strike="noStrike">
               <a:latin typeface="Arial"/>
             </a:endParaRPr>
           </a:p>
@@ -4595,12 +4596,12 @@
               <a:buChar char=""/>
             </a:pPr>
             <a:r>
-              <a:rPr b="0" lang="en-EG" sz="1800" spc="-1" strike="noStrike">
+              <a:rPr b="0" lang="en-US" sz="2000" spc="-1" strike="noStrike">
                 <a:latin typeface="Arial"/>
               </a:rPr>
               <a:t>Fourth Outline Level</a:t>
             </a:r>
-            <a:endParaRPr b="0" lang="en-EG" sz="1800" spc="-1" strike="noStrike">
+            <a:endParaRPr b="0" lang="en-US" sz="2000" spc="-1" strike="noStrike">
               <a:latin typeface="Arial"/>
             </a:endParaRPr>
           </a:p>
@@ -4617,12 +4618,12 @@
               <a:buChar char=""/>
             </a:pPr>
             <a:r>
-              <a:rPr b="0" lang="en-EG" sz="1800" spc="-1" strike="noStrike">
+              <a:rPr b="0" lang="en-US" sz="2000" spc="-1" strike="noStrike">
                 <a:latin typeface="Arial"/>
               </a:rPr>
               <a:t>Fifth Outline Level</a:t>
             </a:r>
-            <a:endParaRPr b="0" lang="en-EG" sz="1800" spc="-1" strike="noStrike">
+            <a:endParaRPr b="0" lang="en-US" sz="2000" spc="-1" strike="noStrike">
               <a:latin typeface="Arial"/>
             </a:endParaRPr>
           </a:p>
@@ -4639,12 +4640,12 @@
               <a:buChar char=""/>
             </a:pPr>
             <a:r>
-              <a:rPr b="0" lang="en-EG" sz="1800" spc="-1" strike="noStrike">
+              <a:rPr b="0" lang="en-US" sz="2000" spc="-1" strike="noStrike">
                 <a:latin typeface="Arial"/>
               </a:rPr>
               <a:t>Sixth Outline Level</a:t>
             </a:r>
-            <a:endParaRPr b="0" lang="en-EG" sz="1800" spc="-1" strike="noStrike">
+            <a:endParaRPr b="0" lang="en-US" sz="2000" spc="-1" strike="noStrike">
               <a:latin typeface="Arial"/>
             </a:endParaRPr>
           </a:p>
@@ -4661,12 +4662,12 @@
               <a:buChar char=""/>
             </a:pPr>
             <a:r>
-              <a:rPr b="0" lang="en-EG" sz="1800" spc="-1" strike="noStrike">
+              <a:rPr b="0" lang="en-US" sz="2000" spc="-1" strike="noStrike">
                 <a:latin typeface="Arial"/>
               </a:rPr>
               <a:t>Seventh Outline Level</a:t>
             </a:r>
-            <a:endParaRPr b="0" lang="en-EG" sz="1800" spc="-1" strike="noStrike">
+            <a:endParaRPr b="0" lang="en-US" sz="2000" spc="-1" strike="noStrike">
               <a:latin typeface="Arial"/>
             </a:endParaRPr>
           </a:p>
@@ -4718,7 +4719,7 @@
         <p:spPr>
           <a:xfrm>
             <a:off x="0" y="0"/>
-            <a:ext cx="10076400" cy="941400"/>
+            <a:ext cx="10076040" cy="941040"/>
           </a:xfrm>
           <a:prstGeom prst="rect">
             <a:avLst/>
@@ -4754,7 +4755,7 @@
         <p:spPr>
           <a:xfrm>
             <a:off x="0" y="6620400"/>
-            <a:ext cx="10076400" cy="941400"/>
+            <a:ext cx="10076040" cy="941040"/>
           </a:xfrm>
           <a:prstGeom prst="rect">
             <a:avLst/>
@@ -4793,8 +4794,8 @@
         </p:nvSpPr>
         <p:spPr>
           <a:xfrm>
-            <a:off x="504000" y="-11160"/>
-            <a:ext cx="9071280" cy="1262160"/>
+            <a:off x="504000" y="301320"/>
+            <a:ext cx="9072000" cy="1261800"/>
           </a:xfrm>
           <a:prstGeom prst="rect">
             <a:avLst/>
@@ -4802,16 +4803,17 @@
         </p:spPr>
         <p:txBody>
           <a:bodyPr lIns="0" rIns="0" tIns="0" bIns="0" anchor="ctr">
-            <a:spAutoFit/>
-          </a:bodyPr>
-          <a:p>
+            <a:noAutofit/>
+          </a:bodyPr>
+          <a:p>
+            <a:pPr algn="ctr"/>
             <a:r>
-              <a:rPr b="0" lang="en-EG" sz="1800" spc="-1" strike="noStrike">
+              <a:rPr b="0" lang="en-US" sz="4400" spc="-1" strike="noStrike">
                 <a:latin typeface="Arial"/>
               </a:rPr>
               <a:t>Click to edit the title text format</a:t>
             </a:r>
-            <a:endParaRPr b="0" lang="en-EG" sz="1800" spc="-1" strike="noStrike">
+            <a:endParaRPr b="0" lang="en-US" sz="4400" spc="-1" strike="noStrike">
               <a:latin typeface="Arial"/>
             </a:endParaRPr>
           </a:p>
@@ -4829,16 +4831,16 @@
         </p:nvSpPr>
         <p:spPr>
           <a:xfrm>
-            <a:off x="504000" y="1769040"/>
-            <a:ext cx="9071280" cy="4384080"/>
-          </a:xfrm>
-          <a:prstGeom prst="rect">
-            <a:avLst/>
-          </a:prstGeom>
-        </p:spPr>
-        <p:txBody>
-          <a:bodyPr lIns="0" rIns="0" tIns="0" bIns="0">
-            <a:noAutofit/>
+            <a:off x="504000" y="1768680"/>
+            <a:ext cx="9072000" cy="4384080"/>
+          </a:xfrm>
+          <a:prstGeom prst="rect">
+            <a:avLst/>
+          </a:prstGeom>
+        </p:spPr>
+        <p:txBody>
+          <a:bodyPr lIns="0" rIns="0" tIns="0" bIns="0">
+            <a:normAutofit/>
           </a:bodyPr>
           <a:p>
             <a:pPr marL="432000" indent="-324000">
@@ -4853,12 +4855,12 @@
               <a:buChar char=""/>
             </a:pPr>
             <a:r>
-              <a:rPr b="0" lang="en-EG" sz="1800" spc="-1" strike="noStrike">
+              <a:rPr b="0" lang="en-US" sz="3200" spc="-1" strike="noStrike">
                 <a:latin typeface="Arial"/>
               </a:rPr>
               <a:t>Click to edit the outline text format</a:t>
             </a:r>
-            <a:endParaRPr b="0" lang="en-EG" sz="1800" spc="-1" strike="noStrike">
+            <a:endParaRPr b="0" lang="en-US" sz="3200" spc="-1" strike="noStrike">
               <a:latin typeface="Arial"/>
             </a:endParaRPr>
           </a:p>
@@ -4875,12 +4877,12 @@
               <a:buChar char=""/>
             </a:pPr>
             <a:r>
-              <a:rPr b="0" lang="en-EG" sz="1800" spc="-1" strike="noStrike">
+              <a:rPr b="0" lang="en-US" sz="2800" spc="-1" strike="noStrike">
                 <a:latin typeface="Arial"/>
               </a:rPr>
               <a:t>Second Outline Level</a:t>
             </a:r>
-            <a:endParaRPr b="0" lang="en-EG" sz="1800" spc="-1" strike="noStrike">
+            <a:endParaRPr b="0" lang="en-US" sz="2800" spc="-1" strike="noStrike">
               <a:latin typeface="Arial"/>
             </a:endParaRPr>
           </a:p>
@@ -4897,12 +4899,12 @@
               <a:buChar char=""/>
             </a:pPr>
             <a:r>
-              <a:rPr b="0" lang="en-EG" sz="1800" spc="-1" strike="noStrike">
+              <a:rPr b="0" lang="en-US" sz="2400" spc="-1" strike="noStrike">
                 <a:latin typeface="Arial"/>
               </a:rPr>
               <a:t>Third Outline Level</a:t>
             </a:r>
-            <a:endParaRPr b="0" lang="en-EG" sz="1800" spc="-1" strike="noStrike">
+            <a:endParaRPr b="0" lang="en-US" sz="2400" spc="-1" strike="noStrike">
               <a:latin typeface="Arial"/>
             </a:endParaRPr>
           </a:p>
@@ -4919,12 +4921,12 @@
               <a:buChar char=""/>
             </a:pPr>
             <a:r>
-              <a:rPr b="0" lang="en-EG" sz="1800" spc="-1" strike="noStrike">
+              <a:rPr b="0" lang="en-US" sz="2000" spc="-1" strike="noStrike">
                 <a:latin typeface="Arial"/>
               </a:rPr>
               <a:t>Fourth Outline Level</a:t>
             </a:r>
-            <a:endParaRPr b="0" lang="en-EG" sz="1800" spc="-1" strike="noStrike">
+            <a:endParaRPr b="0" lang="en-US" sz="2000" spc="-1" strike="noStrike">
               <a:latin typeface="Arial"/>
             </a:endParaRPr>
           </a:p>
@@ -4941,12 +4943,12 @@
               <a:buChar char=""/>
             </a:pPr>
             <a:r>
-              <a:rPr b="0" lang="en-EG" sz="1800" spc="-1" strike="noStrike">
+              <a:rPr b="0" lang="en-US" sz="2000" spc="-1" strike="noStrike">
                 <a:latin typeface="Arial"/>
               </a:rPr>
               <a:t>Fifth Outline Level</a:t>
             </a:r>
-            <a:endParaRPr b="0" lang="en-EG" sz="1800" spc="-1" strike="noStrike">
+            <a:endParaRPr b="0" lang="en-US" sz="2000" spc="-1" strike="noStrike">
               <a:latin typeface="Arial"/>
             </a:endParaRPr>
           </a:p>
@@ -4963,12 +4965,12 @@
               <a:buChar char=""/>
             </a:pPr>
             <a:r>
-              <a:rPr b="0" lang="en-EG" sz="1800" spc="-1" strike="noStrike">
+              <a:rPr b="0" lang="en-US" sz="2000" spc="-1" strike="noStrike">
                 <a:latin typeface="Arial"/>
               </a:rPr>
               <a:t>Sixth Outline Level</a:t>
             </a:r>
-            <a:endParaRPr b="0" lang="en-EG" sz="1800" spc="-1" strike="noStrike">
+            <a:endParaRPr b="0" lang="en-US" sz="2000" spc="-1" strike="noStrike">
               <a:latin typeface="Arial"/>
             </a:endParaRPr>
           </a:p>
@@ -4985,12 +4987,12 @@
               <a:buChar char=""/>
             </a:pPr>
             <a:r>
-              <a:rPr b="0" lang="en-EG" sz="1800" spc="-1" strike="noStrike">
+              <a:rPr b="0" lang="en-US" sz="2000" spc="-1" strike="noStrike">
                 <a:latin typeface="Arial"/>
               </a:rPr>
               <a:t>Seventh Outline Level</a:t>
             </a:r>
-            <a:endParaRPr b="0" lang="en-EG" sz="1800" spc="-1" strike="noStrike">
+            <a:endParaRPr b="0" lang="en-US" sz="2000" spc="-1" strike="noStrike">
               <a:latin typeface="Arial"/>
             </a:endParaRPr>
           </a:p>
@@ -5042,7 +5044,7 @@
         <p:spPr>
           <a:xfrm>
             <a:off x="0" y="2636280"/>
-            <a:ext cx="9071280" cy="671040"/>
+            <a:ext cx="9070920" cy="670680"/>
           </a:xfrm>
           <a:prstGeom prst="rect">
             <a:avLst/>
@@ -5069,15 +5071,16 @@
               </a:lnSpc>
             </a:pPr>
             <a:r>
-              <a:rPr b="0" lang="en-EG" sz="4400" spc="-1" strike="noStrike">
+              <a:rPr b="0" lang="en-US" sz="4400" spc="-1" strike="noStrike">
                 <a:solidFill>
                   <a:srgbClr val="006699"/>
                 </a:solidFill>
                 <a:latin typeface="Arial"/>
+                <a:ea typeface="DejaVu Sans"/>
               </a:rPr>
               <a:t>Tweet Sentiment Analysis</a:t>
             </a:r>
-            <a:endParaRPr b="0" lang="en-EG" sz="4400" spc="-1" strike="noStrike">
+            <a:endParaRPr b="0" lang="en-US" sz="4400" spc="-1" strike="noStrike">
               <a:latin typeface="Arial"/>
             </a:endParaRPr>
           </a:p>
@@ -5122,7 +5125,7 @@
         <p:spPr>
           <a:xfrm>
             <a:off x="504000" y="284400"/>
-            <a:ext cx="9071280" cy="671040"/>
+            <a:ext cx="9070920" cy="670680"/>
           </a:xfrm>
           <a:prstGeom prst="rect">
             <a:avLst/>
@@ -5149,15 +5152,16 @@
               </a:lnSpc>
             </a:pPr>
             <a:r>
-              <a:rPr b="0" lang="en-EG" sz="4400" spc="-1" strike="noStrike">
+              <a:rPr b="0" lang="en-US" sz="4400" spc="-1" strike="noStrike">
                 <a:solidFill>
                   <a:srgbClr val="ffffff"/>
                 </a:solidFill>
                 <a:latin typeface="Arial"/>
+                <a:ea typeface="DejaVu Sans"/>
               </a:rPr>
               <a:t>Results</a:t>
             </a:r>
-            <a:endParaRPr b="0" lang="en-EG" sz="4400" spc="-1" strike="noStrike">
+            <a:endParaRPr b="0" lang="en-US" sz="4400" spc="-1" strike="noStrike">
               <a:latin typeface="Arial"/>
             </a:endParaRPr>
           </a:p>
@@ -5172,7 +5176,7 @@
         <p:spPr>
           <a:xfrm>
             <a:off x="274320" y="1280160"/>
-            <a:ext cx="9459720" cy="4937760"/>
+            <a:ext cx="9459360" cy="4937400"/>
           </a:xfrm>
           <a:prstGeom prst="rect">
             <a:avLst/>
@@ -5198,7 +5202,7 @@
         <p:spPr>
           <a:xfrm>
             <a:off x="255600" y="1136160"/>
-            <a:ext cx="9071280" cy="4846320"/>
+            <a:ext cx="9070920" cy="4845960"/>
           </a:xfrm>
           <a:prstGeom prst="rect">
             <a:avLst/>
@@ -5219,7 +5223,7 @@
             <a:noAutofit/>
           </a:bodyPr>
           <a:p>
-            <a:pPr marL="432000" indent="-323640">
+            <a:pPr marL="432000" indent="-323280">
               <a:lnSpc>
                 <a:spcPct val="100000"/>
               </a:lnSpc>
@@ -5234,34 +5238,29 @@
               <a:buChar char=""/>
             </a:pPr>
             <a:r>
-              <a:rPr b="0" lang="en-EG" sz="2600" spc="-1" strike="noStrike">
+              <a:rPr b="0" lang="en-US" sz="2600" spc="-1" strike="noStrike">
                 <a:solidFill>
                   <a:srgbClr val="0066cc"/>
                 </a:solidFill>
                 <a:latin typeface="Arial"/>
+                <a:ea typeface="DejaVu Sans"/>
               </a:rPr>
               <a:t>Logistic Regression</a:t>
             </a:r>
-            <a:endParaRPr b="0" lang="en-EG" sz="2600" spc="-1" strike="noStrike">
-              <a:latin typeface="Arial"/>
-            </a:endParaRPr>
-          </a:p>
-          <a:p>
-            <a:pPr marL="432000" indent="-323640">
+            <a:endParaRPr b="0" lang="en-US" sz="2600" spc="-1" strike="noStrike">
+              <a:latin typeface="Arial"/>
+            </a:endParaRPr>
+          </a:p>
+          <a:p>
+            <a:pPr>
               <a:lnSpc>
                 <a:spcPct val="100000"/>
               </a:lnSpc>
               <a:spcBef>
                 <a:spcPts val="1417"/>
               </a:spcBef>
-              <a:buClr>
-                <a:srgbClr val="000000"/>
-              </a:buClr>
-              <a:buSzPct val="45000"/>
-              <a:buFont typeface="Wingdings" charset="2"/>
-              <a:buChar char=""/>
             </a:pPr>
-            <a:endParaRPr b="0" lang="en-EG" sz="2600" spc="-1" strike="noStrike">
+            <a:endParaRPr b="0" lang="en-US" sz="2600" spc="-1" strike="noStrike">
               <a:latin typeface="Arial"/>
             </a:endParaRPr>
           </a:p>
@@ -5280,7 +5279,7 @@
         <p:spPr>
           <a:xfrm>
             <a:off x="630360" y="1717560"/>
-            <a:ext cx="9090360" cy="3951720"/>
+            <a:ext cx="9090000" cy="3951360"/>
           </a:xfrm>
           <a:prstGeom prst="rect">
             <a:avLst/>
@@ -5329,7 +5328,7 @@
         <p:spPr>
           <a:xfrm>
             <a:off x="504000" y="284400"/>
-            <a:ext cx="9071280" cy="671040"/>
+            <a:ext cx="9070920" cy="670680"/>
           </a:xfrm>
           <a:prstGeom prst="rect">
             <a:avLst/>
@@ -5356,15 +5355,16 @@
               </a:lnSpc>
             </a:pPr>
             <a:r>
-              <a:rPr b="0" lang="en-EG" sz="4400" spc="-1" strike="noStrike">
+              <a:rPr b="0" lang="en-US" sz="4400" spc="-1" strike="noStrike">
                 <a:solidFill>
                   <a:srgbClr val="ffffff"/>
                 </a:solidFill>
                 <a:latin typeface="Arial"/>
+                <a:ea typeface="DejaVu Sans"/>
               </a:rPr>
               <a:t>Results</a:t>
             </a:r>
-            <a:endParaRPr b="0" lang="en-EG" sz="4400" spc="-1" strike="noStrike">
+            <a:endParaRPr b="0" lang="en-US" sz="4400" spc="-1" strike="noStrike">
               <a:latin typeface="Arial"/>
             </a:endParaRPr>
           </a:p>
@@ -5379,7 +5379,7 @@
         <p:spPr>
           <a:xfrm>
             <a:off x="274320" y="1280160"/>
-            <a:ext cx="9459720" cy="4937760"/>
+            <a:ext cx="9459360" cy="4937400"/>
           </a:xfrm>
           <a:prstGeom prst="rect">
             <a:avLst/>
@@ -5405,7 +5405,7 @@
         <p:spPr>
           <a:xfrm>
             <a:off x="255600" y="1136160"/>
-            <a:ext cx="9071280" cy="4846320"/>
+            <a:ext cx="9070920" cy="4845960"/>
           </a:xfrm>
           <a:prstGeom prst="rect">
             <a:avLst/>
@@ -5426,7 +5426,7 @@
             <a:noAutofit/>
           </a:bodyPr>
           <a:p>
-            <a:pPr marL="432000" indent="-323640">
+            <a:pPr marL="432000" indent="-323280">
               <a:lnSpc>
                 <a:spcPct val="100000"/>
               </a:lnSpc>
@@ -5441,34 +5441,29 @@
               <a:buChar char=""/>
             </a:pPr>
             <a:r>
-              <a:rPr b="0" lang="en-EG" sz="2600" spc="-1" strike="noStrike">
+              <a:rPr b="0" lang="en-US" sz="2600" spc="-1" strike="noStrike">
                 <a:solidFill>
                   <a:srgbClr val="0066cc"/>
                 </a:solidFill>
                 <a:latin typeface="Arial"/>
+                <a:ea typeface="DejaVu Sans"/>
               </a:rPr>
               <a:t>SVM</a:t>
             </a:r>
-            <a:endParaRPr b="0" lang="en-EG" sz="2600" spc="-1" strike="noStrike">
-              <a:latin typeface="Arial"/>
-            </a:endParaRPr>
-          </a:p>
-          <a:p>
-            <a:pPr marL="432000" indent="-323640">
+            <a:endParaRPr b="0" lang="en-US" sz="2600" spc="-1" strike="noStrike">
+              <a:latin typeface="Arial"/>
+            </a:endParaRPr>
+          </a:p>
+          <a:p>
+            <a:pPr>
               <a:lnSpc>
                 <a:spcPct val="100000"/>
               </a:lnSpc>
               <a:spcBef>
                 <a:spcPts val="1417"/>
               </a:spcBef>
-              <a:buClr>
-                <a:srgbClr val="000000"/>
-              </a:buClr>
-              <a:buSzPct val="45000"/>
-              <a:buFont typeface="Wingdings" charset="2"/>
-              <a:buChar char=""/>
             </a:pPr>
-            <a:endParaRPr b="0" lang="en-EG" sz="2600" spc="-1" strike="noStrike">
+            <a:endParaRPr b="0" lang="en-US" sz="2600" spc="-1" strike="noStrike">
               <a:latin typeface="Arial"/>
             </a:endParaRPr>
           </a:p>
@@ -5487,7 +5482,7 @@
         <p:spPr>
           <a:xfrm>
             <a:off x="640080" y="1828800"/>
-            <a:ext cx="9140400" cy="3840480"/>
+            <a:ext cx="9140040" cy="3840120"/>
           </a:xfrm>
           <a:prstGeom prst="rect">
             <a:avLst/>
@@ -5535,8 +5530,8 @@
         </p:nvSpPr>
         <p:spPr>
           <a:xfrm>
-            <a:off x="0" y="1296360"/>
-            <a:ext cx="9071280" cy="3350880"/>
+            <a:off x="0" y="1630800"/>
+            <a:ext cx="9070920" cy="2682000"/>
           </a:xfrm>
           <a:prstGeom prst="rect">
             <a:avLst/>
@@ -5563,15 +5558,16 @@
               </a:lnSpc>
             </a:pPr>
             <a:r>
-              <a:rPr b="0" lang="en-EG" sz="4400" spc="-1" strike="noStrike">
+              <a:rPr b="0" lang="en-US" sz="4400" spc="-1" strike="noStrike">
                 <a:solidFill>
                   <a:srgbClr val="006699"/>
                 </a:solidFill>
                 <a:latin typeface="Arial"/>
+                <a:ea typeface="DejaVu Sans"/>
               </a:rPr>
               <a:t>Thanks</a:t>
             </a:r>
-            <a:endParaRPr b="0" lang="en-EG" sz="4400" spc="-1" strike="noStrike">
+            <a:endParaRPr b="0" lang="en-US" sz="4400" spc="-1" strike="noStrike">
               <a:latin typeface="Arial"/>
             </a:endParaRPr>
           </a:p>
@@ -5581,7 +5577,7 @@
                 <a:spcPct val="100000"/>
               </a:lnSpc>
             </a:pPr>
-            <a:endParaRPr b="0" lang="en-EG" sz="4400" spc="-1" strike="noStrike">
+            <a:endParaRPr b="0" lang="en-US" sz="4400" spc="-1" strike="noStrike">
               <a:latin typeface="Arial"/>
             </a:endParaRPr>
           </a:p>
@@ -5591,7 +5587,7 @@
                 <a:spcPct val="100000"/>
               </a:lnSpc>
             </a:pPr>
-            <a:endParaRPr b="0" lang="en-EG" sz="4400" spc="-1" strike="noStrike">
+            <a:endParaRPr b="0" lang="en-US" sz="4400" spc="-1" strike="noStrike">
               <a:latin typeface="Arial"/>
             </a:endParaRPr>
           </a:p>
@@ -5602,34 +5598,16 @@
               </a:lnSpc>
             </a:pPr>
             <a:r>
-              <a:rPr b="0" lang="en-EG" sz="4400" spc="-1" strike="noStrike">
+              <a:rPr b="0" lang="en-US" sz="4400" spc="-1" strike="noStrike">
                 <a:solidFill>
                   <a:srgbClr val="006699"/>
                 </a:solidFill>
                 <a:latin typeface="Arial"/>
+                <a:ea typeface="DejaVu Sans"/>
               </a:rPr>
               <a:t>Sameh Amin</a:t>
             </a:r>
-            <a:endParaRPr b="0" lang="en-EG" sz="4400" spc="-1" strike="noStrike">
-              <a:latin typeface="Arial"/>
-            </a:endParaRPr>
-          </a:p>
-          <a:p>
-            <a:pPr algn="ctr">
-              <a:lnSpc>
-                <a:spcPct val="100000"/>
-              </a:lnSpc>
-            </a:pPr>
-            <a:r>
-              <a:rPr b="0" lang="en-EG" sz="4400" spc="-1" strike="noStrike">
-                <a:solidFill>
-                  <a:srgbClr val="006699"/>
-                </a:solidFill>
-                <a:latin typeface="Arial"/>
-              </a:rPr>
-              <a:t>24 July 2019</a:t>
-            </a:r>
-            <a:endParaRPr b="0" lang="en-EG" sz="4400" spc="-1" strike="noStrike">
+            <a:endParaRPr b="0" lang="en-US" sz="4400" spc="-1" strike="noStrike">
               <a:latin typeface="Arial"/>
             </a:endParaRPr>
           </a:p>
@@ -5674,7 +5652,7 @@
         <p:spPr>
           <a:xfrm>
             <a:off x="504000" y="285120"/>
-            <a:ext cx="9071280" cy="669600"/>
+            <a:ext cx="9070920" cy="669600"/>
           </a:xfrm>
           <a:prstGeom prst="rect">
             <a:avLst/>
@@ -5701,15 +5679,16 @@
               </a:lnSpc>
             </a:pPr>
             <a:r>
-              <a:rPr b="0" lang="en-EG" sz="4400" spc="-1" strike="noStrike">
+              <a:rPr b="0" lang="en-US" sz="4400" spc="-1" strike="noStrike">
                 <a:solidFill>
                   <a:srgbClr val="ffffff"/>
                 </a:solidFill>
                 <a:latin typeface="Arial"/>
+                <a:ea typeface="DejaVu Sans"/>
               </a:rPr>
               <a:t>The Big Picture</a:t>
             </a:r>
-            <a:endParaRPr b="0" lang="en-EG" sz="4400" spc="-1" strike="noStrike">
+            <a:endParaRPr b="0" lang="en-US" sz="4400" spc="-1" strike="noStrike">
               <a:latin typeface="Arial"/>
             </a:endParaRPr>
           </a:p>
@@ -5724,7 +5703,7 @@
         <p:spPr>
           <a:xfrm>
             <a:off x="504000" y="1805040"/>
-            <a:ext cx="9071280" cy="4384080"/>
+            <a:ext cx="9070920" cy="4383720"/>
           </a:xfrm>
           <a:prstGeom prst="rect">
             <a:avLst/>
@@ -5745,7 +5724,7 @@
             <a:noAutofit/>
           </a:bodyPr>
           <a:p>
-            <a:pPr marL="432000" indent="-323640">
+            <a:pPr marL="432000" indent="-323280">
               <a:lnSpc>
                 <a:spcPct val="100000"/>
               </a:lnSpc>
@@ -5760,20 +5739,21 @@
               <a:buChar char=""/>
             </a:pPr>
             <a:r>
-              <a:rPr b="1" lang="en-EG" sz="3200" spc="-1" strike="noStrike">
+              <a:rPr b="1" lang="en-US" sz="3200" spc="-1" strike="noStrike">
                 <a:solidFill>
                   <a:srgbClr val="0066cc"/>
                 </a:solidFill>
                 <a:latin typeface="Arial"/>
+                <a:ea typeface="DejaVu Sans"/>
               </a:rPr>
               <a:t>Problem</a:t>
             </a:r>
-            <a:endParaRPr b="0" lang="en-EG" sz="3200" spc="-1" strike="noStrike">
-              <a:latin typeface="Arial"/>
-            </a:endParaRPr>
-          </a:p>
-          <a:p>
-            <a:pPr marL="432000" indent="-323640">
+            <a:endParaRPr b="0" lang="en-US" sz="3200" spc="-1" strike="noStrike">
+              <a:latin typeface="Arial"/>
+            </a:endParaRPr>
+          </a:p>
+          <a:p>
+            <a:pPr marL="432000" indent="-323280">
               <a:lnSpc>
                 <a:spcPct val="100000"/>
               </a:lnSpc>
@@ -5788,20 +5768,21 @@
               <a:buChar char=""/>
             </a:pPr>
             <a:r>
-              <a:rPr b="0" lang="en-EG" sz="3200" spc="-1" strike="noStrike">
+              <a:rPr b="0" lang="en-US" sz="3200" spc="-1" strike="noStrike">
                 <a:solidFill>
                   <a:srgbClr val="0066cc"/>
                 </a:solidFill>
                 <a:latin typeface="Arial"/>
+                <a:ea typeface="DejaVu Sans"/>
               </a:rPr>
               <a:t>Detect the sentiment of a given tweet using machine learning model.</a:t>
             </a:r>
-            <a:endParaRPr b="0" lang="en-EG" sz="3200" spc="-1" strike="noStrike">
-              <a:latin typeface="Arial"/>
-            </a:endParaRPr>
-          </a:p>
-          <a:p>
-            <a:pPr marL="432000" indent="-323640">
+            <a:endParaRPr b="0" lang="en-US" sz="3200" spc="-1" strike="noStrike">
+              <a:latin typeface="Arial"/>
+            </a:endParaRPr>
+          </a:p>
+          <a:p>
+            <a:pPr marL="432000" indent="-323280">
               <a:lnSpc>
                 <a:spcPct val="100000"/>
               </a:lnSpc>
@@ -5816,20 +5797,21 @@
               <a:buChar char=""/>
             </a:pPr>
             <a:r>
-              <a:rPr b="1" lang="en-EG" sz="3200" spc="-1" strike="noStrike">
+              <a:rPr b="1" lang="en-US" sz="3200" spc="-1" strike="noStrike">
                 <a:solidFill>
                   <a:srgbClr val="0066cc"/>
                 </a:solidFill>
                 <a:latin typeface="Arial"/>
+                <a:ea typeface="DejaVu Sans"/>
               </a:rPr>
               <a:t>Performance score metrics</a:t>
             </a:r>
-            <a:endParaRPr b="0" lang="en-EG" sz="3200" spc="-1" strike="noStrike">
-              <a:latin typeface="Arial"/>
-            </a:endParaRPr>
-          </a:p>
-          <a:p>
-            <a:pPr marL="432000" indent="-323640">
+            <a:endParaRPr b="0" lang="en-US" sz="3200" spc="-1" strike="noStrike">
+              <a:latin typeface="Arial"/>
+            </a:endParaRPr>
+          </a:p>
+          <a:p>
+            <a:pPr marL="432000" indent="-323280">
               <a:lnSpc>
                 <a:spcPct val="100000"/>
               </a:lnSpc>
@@ -5844,15 +5826,16 @@
               <a:buChar char=""/>
             </a:pPr>
             <a:r>
-              <a:rPr b="0" lang="en-EG" sz="3200" spc="-1" strike="noStrike">
+              <a:rPr b="0" lang="en-US" sz="3200" spc="-1" strike="noStrike">
                 <a:solidFill>
                   <a:srgbClr val="0066cc"/>
                 </a:solidFill>
                 <a:latin typeface="Arial"/>
+                <a:ea typeface="DejaVu Sans"/>
               </a:rPr>
               <a:t>Recall, Precision, F1 score</a:t>
             </a:r>
-            <a:endParaRPr b="0" lang="en-EG" sz="3200" spc="-1" strike="noStrike">
+            <a:endParaRPr b="0" lang="en-US" sz="3200" spc="-1" strike="noStrike">
               <a:latin typeface="Arial"/>
             </a:endParaRPr>
           </a:p>
@@ -5897,7 +5880,7 @@
         <p:spPr>
           <a:xfrm>
             <a:off x="504000" y="285120"/>
-            <a:ext cx="9071280" cy="669600"/>
+            <a:ext cx="9070920" cy="669600"/>
           </a:xfrm>
           <a:prstGeom prst="rect">
             <a:avLst/>
@@ -5924,15 +5907,16 @@
               </a:lnSpc>
             </a:pPr>
             <a:r>
-              <a:rPr b="0" lang="en-EG" sz="4400" spc="-1" strike="noStrike">
+              <a:rPr b="0" lang="en-US" sz="4400" spc="-1" strike="noStrike">
                 <a:solidFill>
                   <a:srgbClr val="ffffff"/>
                 </a:solidFill>
                 <a:latin typeface="Arial"/>
+                <a:ea typeface="DejaVu Sans"/>
               </a:rPr>
               <a:t>Exploration – the data attributes</a:t>
             </a:r>
-            <a:endParaRPr b="0" lang="en-EG" sz="4400" spc="-1" strike="noStrike">
+            <a:endParaRPr b="0" lang="en-US" sz="4400" spc="-1" strike="noStrike">
               <a:latin typeface="Arial"/>
             </a:endParaRPr>
           </a:p>
@@ -5947,7 +5931,7 @@
         <p:spPr>
           <a:xfrm>
             <a:off x="324000" y="1589040"/>
-            <a:ext cx="9071280" cy="4384080"/>
+            <a:ext cx="9070920" cy="4383720"/>
           </a:xfrm>
           <a:prstGeom prst="rect">
             <a:avLst/>
@@ -5968,7 +5952,7 @@
             <a:noAutofit/>
           </a:bodyPr>
           <a:p>
-            <a:pPr marL="432000" indent="-323640">
+            <a:pPr marL="432000" indent="-323280">
               <a:lnSpc>
                 <a:spcPct val="100000"/>
               </a:lnSpc>
@@ -5983,20 +5967,21 @@
               <a:buChar char=""/>
             </a:pPr>
             <a:r>
-              <a:rPr b="1" lang="en-EG" sz="2400" spc="-1" strike="noStrike">
+              <a:rPr b="1" lang="en-US" sz="2400" spc="-1" strike="noStrike">
                 <a:solidFill>
                   <a:srgbClr val="0066cc"/>
                 </a:solidFill>
                 <a:latin typeface="Arial"/>
+                <a:ea typeface="DejaVu Sans"/>
               </a:rPr>
               <a:t>Airline sentiment</a:t>
             </a:r>
-            <a:endParaRPr b="0" lang="en-EG" sz="2400" spc="-1" strike="noStrike">
-              <a:latin typeface="Arial"/>
-            </a:endParaRPr>
-          </a:p>
-          <a:p>
-            <a:pPr marL="432000" indent="-323640">
+            <a:endParaRPr b="0" lang="en-US" sz="2400" spc="-1" strike="noStrike">
+              <a:latin typeface="Arial"/>
+            </a:endParaRPr>
+          </a:p>
+          <a:p>
+            <a:pPr marL="432000" indent="-323280">
               <a:lnSpc>
                 <a:spcPct val="100000"/>
               </a:lnSpc>
@@ -6011,20 +5996,21 @@
               <a:buChar char=""/>
             </a:pPr>
             <a:r>
-              <a:rPr b="0" lang="en-EG" sz="2400" spc="-1" strike="noStrike">
+              <a:rPr b="0" lang="en-US" sz="2400" spc="-1" strike="noStrike">
                 <a:solidFill>
                   <a:srgbClr val="0066cc"/>
                 </a:solidFill>
                 <a:latin typeface="Arial"/>
+                <a:ea typeface="DejaVu Sans"/>
               </a:rPr>
               <a:t>The label, including 3 classes (Positive, negative and Neutral). Will be used for multiclass classification of the sentiment.</a:t>
             </a:r>
-            <a:endParaRPr b="0" lang="en-EG" sz="2400" spc="-1" strike="noStrike">
-              <a:latin typeface="Arial"/>
-            </a:endParaRPr>
-          </a:p>
-          <a:p>
-            <a:pPr marL="432000" indent="-323640">
+            <a:endParaRPr b="0" lang="en-US" sz="2400" spc="-1" strike="noStrike">
+              <a:latin typeface="Arial"/>
+            </a:endParaRPr>
+          </a:p>
+          <a:p>
+            <a:pPr marL="432000" indent="-323280">
               <a:lnSpc>
                 <a:spcPct val="100000"/>
               </a:lnSpc>
@@ -6039,20 +6025,21 @@
               <a:buChar char=""/>
             </a:pPr>
             <a:r>
-              <a:rPr b="1" lang="en-EG" sz="2400" spc="-1" strike="noStrike">
+              <a:rPr b="1" lang="en-US" sz="2400" spc="-1" strike="noStrike">
                 <a:solidFill>
                   <a:srgbClr val="0066cc"/>
                 </a:solidFill>
                 <a:latin typeface="Arial"/>
+                <a:ea typeface="DejaVu Sans"/>
               </a:rPr>
               <a:t>Features will be used</a:t>
             </a:r>
-            <a:endParaRPr b="0" lang="en-EG" sz="2400" spc="-1" strike="noStrike">
-              <a:latin typeface="Arial"/>
-            </a:endParaRPr>
-          </a:p>
-          <a:p>
-            <a:pPr marL="432000" indent="-323640">
+            <a:endParaRPr b="0" lang="en-US" sz="2400" spc="-1" strike="noStrike">
+              <a:latin typeface="Arial"/>
+            </a:endParaRPr>
+          </a:p>
+          <a:p>
+            <a:pPr marL="432000" indent="-323280">
               <a:lnSpc>
                 <a:spcPct val="100000"/>
               </a:lnSpc>
@@ -6067,20 +6054,21 @@
               <a:buChar char=""/>
             </a:pPr>
             <a:r>
-              <a:rPr b="0" lang="en-EG" sz="2400" spc="-1" strike="noStrike">
+              <a:rPr b="0" lang="en-US" sz="2400" spc="-1" strike="noStrike">
                 <a:solidFill>
                   <a:srgbClr val="0066cc"/>
                 </a:solidFill>
                 <a:latin typeface="Arial"/>
+                <a:ea typeface="DejaVu Sans"/>
               </a:rPr>
               <a:t>For this assignment i’m going to use (name, text or “the tweet”, user timezone) as machine learning features to predict the sentiment.</a:t>
             </a:r>
-            <a:endParaRPr b="0" lang="en-EG" sz="2400" spc="-1" strike="noStrike">
-              <a:latin typeface="Arial"/>
-            </a:endParaRPr>
-          </a:p>
-          <a:p>
-            <a:pPr marL="432000" indent="-323640">
+            <a:endParaRPr b="0" lang="en-US" sz="2400" spc="-1" strike="noStrike">
+              <a:latin typeface="Arial"/>
+            </a:endParaRPr>
+          </a:p>
+          <a:p>
+            <a:pPr marL="432000" indent="-323280">
               <a:lnSpc>
                 <a:spcPct val="100000"/>
               </a:lnSpc>
@@ -6095,20 +6083,21 @@
               <a:buChar char=""/>
             </a:pPr>
             <a:r>
-              <a:rPr b="1" lang="en-EG" sz="2400" spc="-1" strike="noStrike">
+              <a:rPr b="1" lang="en-US" sz="2400" spc="-1" strike="noStrike">
                 <a:solidFill>
                   <a:srgbClr val="0066cc"/>
                 </a:solidFill>
                 <a:latin typeface="Arial"/>
+                <a:ea typeface="DejaVu Sans"/>
               </a:rPr>
               <a:t>Features may be used later to enhance the accuracy</a:t>
             </a:r>
-            <a:endParaRPr b="0" lang="en-EG" sz="2400" spc="-1" strike="noStrike">
-              <a:latin typeface="Arial"/>
-            </a:endParaRPr>
-          </a:p>
-          <a:p>
-            <a:pPr marL="432000" indent="-323640">
+            <a:endParaRPr b="0" lang="en-US" sz="2400" spc="-1" strike="noStrike">
+              <a:latin typeface="Arial"/>
+            </a:endParaRPr>
+          </a:p>
+          <a:p>
+            <a:pPr marL="432000" indent="-323280">
               <a:lnSpc>
                 <a:spcPct val="100000"/>
               </a:lnSpc>
@@ -6123,15 +6112,16 @@
               <a:buChar char=""/>
             </a:pPr>
             <a:r>
-              <a:rPr b="0" lang="en-EG" sz="2400" spc="-1" strike="noStrike">
+              <a:rPr b="0" lang="en-US" sz="2400" spc="-1" strike="noStrike">
                 <a:solidFill>
                   <a:srgbClr val="0066cc"/>
                 </a:solidFill>
                 <a:latin typeface="Arial"/>
+                <a:ea typeface="DejaVu Sans"/>
               </a:rPr>
               <a:t>Add (tweet coordinates and tweet created date) to the features, which should enhance the prediction accuracy.</a:t>
             </a:r>
-            <a:endParaRPr b="0" lang="en-EG" sz="2400" spc="-1" strike="noStrike">
+            <a:endParaRPr b="0" lang="en-US" sz="2400" spc="-1" strike="noStrike">
               <a:latin typeface="Arial"/>
             </a:endParaRPr>
           </a:p>
@@ -6176,7 +6166,7 @@
         <p:spPr>
           <a:xfrm>
             <a:off x="504000" y="285120"/>
-            <a:ext cx="9071280" cy="669600"/>
+            <a:ext cx="9070920" cy="669600"/>
           </a:xfrm>
           <a:prstGeom prst="rect">
             <a:avLst/>
@@ -6203,15 +6193,16 @@
               </a:lnSpc>
             </a:pPr>
             <a:r>
-              <a:rPr b="0" lang="en-EG" sz="4400" spc="-1" strike="noStrike">
+              <a:rPr b="0" lang="en-US" sz="4400" spc="-1" strike="noStrike">
                 <a:solidFill>
                   <a:srgbClr val="ffffff"/>
                 </a:solidFill>
                 <a:latin typeface="Arial"/>
+                <a:ea typeface="DejaVu Sans"/>
               </a:rPr>
               <a:t>Exploration – Insights</a:t>
             </a:r>
-            <a:endParaRPr b="0" lang="en-EG" sz="4400" spc="-1" strike="noStrike">
+            <a:endParaRPr b="0" lang="en-US" sz="4400" spc="-1" strike="noStrike">
               <a:latin typeface="Arial"/>
             </a:endParaRPr>
           </a:p>
@@ -6226,7 +6217,7 @@
         <p:spPr>
           <a:xfrm>
             <a:off x="324000" y="1589040"/>
-            <a:ext cx="3607560" cy="4384080"/>
+            <a:ext cx="3607200" cy="4383720"/>
           </a:xfrm>
           <a:prstGeom prst="rect">
             <a:avLst/>
@@ -6247,7 +6238,7 @@
             <a:noAutofit/>
           </a:bodyPr>
           <a:p>
-            <a:pPr marL="432000" indent="-323640">
+            <a:pPr marL="432000" indent="-323280">
               <a:lnSpc>
                 <a:spcPct val="100000"/>
               </a:lnSpc>
@@ -6262,20 +6253,21 @@
               <a:buChar char=""/>
             </a:pPr>
             <a:r>
-              <a:rPr b="0" lang="en-EG" sz="2400" spc="-1" strike="noStrike">
+              <a:rPr b="0" lang="en-US" sz="2400" spc="-1" strike="noStrike">
                 <a:solidFill>
                   <a:srgbClr val="0066cc"/>
                 </a:solidFill>
                 <a:latin typeface="Arial"/>
+                <a:ea typeface="DejaVu Sans"/>
               </a:rPr>
               <a:t>Most of sentiment classes are negative.</a:t>
             </a:r>
-            <a:endParaRPr b="0" lang="en-EG" sz="2400" spc="-1" strike="noStrike">
-              <a:latin typeface="Arial"/>
-            </a:endParaRPr>
-          </a:p>
-          <a:p>
-            <a:pPr marL="432000" indent="-323640">
+            <a:endParaRPr b="0" lang="en-US" sz="2400" spc="-1" strike="noStrike">
+              <a:latin typeface="Arial"/>
+            </a:endParaRPr>
+          </a:p>
+          <a:p>
+            <a:pPr marL="432000" indent="-323280">
               <a:lnSpc>
                 <a:spcPct val="100000"/>
               </a:lnSpc>
@@ -6290,20 +6282,21 @@
               <a:buChar char=""/>
             </a:pPr>
             <a:r>
-              <a:rPr b="0" lang="en-EG" sz="2400" spc="-1" strike="noStrike">
+              <a:rPr b="0" lang="en-US" sz="2400" spc="-1" strike="noStrike">
                 <a:solidFill>
                   <a:srgbClr val="0066cc"/>
                 </a:solidFill>
                 <a:latin typeface="Arial"/>
+                <a:ea typeface="DejaVu Sans"/>
               </a:rPr>
               <a:t>Most of tweets come from US &amp; Canada.</a:t>
             </a:r>
-            <a:endParaRPr b="0" lang="en-EG" sz="2400" spc="-1" strike="noStrike">
-              <a:latin typeface="Arial"/>
-            </a:endParaRPr>
-          </a:p>
-          <a:p>
-            <a:pPr marL="432000" indent="-323640">
+            <a:endParaRPr b="0" lang="en-US" sz="2400" spc="-1" strike="noStrike">
+              <a:latin typeface="Arial"/>
+            </a:endParaRPr>
+          </a:p>
+          <a:p>
+            <a:pPr marL="432000" indent="-323280">
               <a:lnSpc>
                 <a:spcPct val="100000"/>
               </a:lnSpc>
@@ -6318,15 +6311,16 @@
               <a:buChar char=""/>
             </a:pPr>
             <a:r>
-              <a:rPr b="0" lang="en-EG" sz="2400" spc="-1" strike="noStrike">
+              <a:rPr b="0" lang="en-US" sz="2400" spc="-1" strike="noStrike">
                 <a:solidFill>
                   <a:srgbClr val="0066cc"/>
                 </a:solidFill>
                 <a:latin typeface="Arial"/>
+                <a:ea typeface="DejaVu Sans"/>
               </a:rPr>
               <a:t>Most of tweets come from Boston.</a:t>
             </a:r>
-            <a:endParaRPr b="0" lang="en-EG" sz="2400" spc="-1" strike="noStrike">
+            <a:endParaRPr b="0" lang="en-US" sz="2400" spc="-1" strike="noStrike">
               <a:latin typeface="Arial"/>
             </a:endParaRPr>
           </a:p>
@@ -6345,7 +6339,7 @@
         <p:spPr>
           <a:xfrm>
             <a:off x="3714840" y="933480"/>
-            <a:ext cx="6356160" cy="5649840"/>
+            <a:ext cx="6355800" cy="5649480"/>
           </a:xfrm>
           <a:prstGeom prst="rect">
             <a:avLst/>
@@ -6394,7 +6388,7 @@
         <p:spPr>
           <a:xfrm>
             <a:off x="504000" y="285120"/>
-            <a:ext cx="9071280" cy="669600"/>
+            <a:ext cx="9070920" cy="669600"/>
           </a:xfrm>
           <a:prstGeom prst="rect">
             <a:avLst/>
@@ -6421,15 +6415,16 @@
               </a:lnSpc>
             </a:pPr>
             <a:r>
-              <a:rPr b="0" lang="en-EG" sz="4400" spc="-1" strike="noStrike">
+              <a:rPr b="0" lang="en-US" sz="4400" spc="-1" strike="noStrike">
                 <a:solidFill>
                   <a:srgbClr val="ffffff"/>
                 </a:solidFill>
                 <a:latin typeface="Arial"/>
+                <a:ea typeface="DejaVu Sans"/>
               </a:rPr>
               <a:t>Data Cleansing &amp; Pre-processing</a:t>
             </a:r>
-            <a:endParaRPr b="0" lang="en-EG" sz="4400" spc="-1" strike="noStrike">
+            <a:endParaRPr b="0" lang="en-US" sz="4400" spc="-1" strike="noStrike">
               <a:latin typeface="Arial"/>
             </a:endParaRPr>
           </a:p>
@@ -6444,7 +6439,7 @@
         <p:spPr>
           <a:xfrm>
             <a:off x="274320" y="1280160"/>
-            <a:ext cx="9459720" cy="4937760"/>
+            <a:ext cx="9459360" cy="4937400"/>
           </a:xfrm>
           <a:prstGeom prst="rect">
             <a:avLst/>
@@ -6470,7 +6465,7 @@
         <p:spPr>
           <a:xfrm>
             <a:off x="255600" y="1136160"/>
-            <a:ext cx="9071280" cy="4846320"/>
+            <a:ext cx="9070920" cy="4845960"/>
           </a:xfrm>
           <a:prstGeom prst="rect">
             <a:avLst/>
@@ -6500,15 +6495,16 @@
               </a:spcBef>
             </a:pPr>
             <a:r>
-              <a:rPr b="1" lang="en-EG" sz="2000" spc="-1" strike="noStrike">
+              <a:rPr b="1" lang="en-US" sz="2000" spc="-1" strike="noStrike">
                 <a:solidFill>
                   <a:srgbClr val="0066cc"/>
                 </a:solidFill>
                 <a:latin typeface="Arial"/>
+                <a:ea typeface="DejaVu Sans"/>
               </a:rPr>
               <a:t>Remove duplicates</a:t>
             </a:r>
-            <a:endParaRPr b="0" lang="en-EG" sz="2000" spc="-1" strike="noStrike">
+            <a:endParaRPr b="0" lang="en-US" sz="2000" spc="-1" strike="noStrike">
               <a:latin typeface="Arial"/>
             </a:endParaRPr>
           </a:p>
@@ -6522,15 +6518,16 @@
               </a:spcBef>
             </a:pPr>
             <a:r>
-              <a:rPr b="0" lang="en-EG" sz="2000" spc="-1" strike="noStrike">
+              <a:rPr b="0" lang="en-US" sz="2000" spc="-1" strike="noStrike">
                 <a:solidFill>
                   <a:srgbClr val="0066cc"/>
                 </a:solidFill>
                 <a:latin typeface="Arial"/>
+                <a:ea typeface="DejaVu Sans"/>
               </a:rPr>
               <a:t>I removed the duplicates tweets text.</a:t>
             </a:r>
-            <a:endParaRPr b="0" lang="en-EG" sz="2000" spc="-1" strike="noStrike">
+            <a:endParaRPr b="0" lang="en-US" sz="2000" spc="-1" strike="noStrike">
               <a:latin typeface="Arial"/>
             </a:endParaRPr>
           </a:p>
@@ -6544,15 +6541,16 @@
               </a:spcBef>
             </a:pPr>
             <a:r>
-              <a:rPr b="1" lang="en-EG" sz="2000" spc="-1" strike="noStrike">
+              <a:rPr b="1" lang="en-US" sz="2000" spc="-1" strike="noStrike">
                 <a:solidFill>
                   <a:srgbClr val="0066cc"/>
                 </a:solidFill>
                 <a:latin typeface="Arial"/>
+                <a:ea typeface="DejaVu Sans"/>
               </a:rPr>
               <a:t>Null values</a:t>
             </a:r>
-            <a:endParaRPr b="0" lang="en-EG" sz="2000" spc="-1" strike="noStrike">
+            <a:endParaRPr b="0" lang="en-US" sz="2000" spc="-1" strike="noStrike">
               <a:latin typeface="Arial"/>
             </a:endParaRPr>
           </a:p>
@@ -6566,15 +6564,16 @@
               </a:spcBef>
             </a:pPr>
             <a:r>
-              <a:rPr b="0" lang="en-EG" sz="2000" spc="-1" strike="noStrike">
+              <a:rPr b="0" lang="en-US" sz="2000" spc="-1" strike="noStrike">
                 <a:solidFill>
                   <a:srgbClr val="0066cc"/>
                 </a:solidFill>
                 <a:latin typeface="Arial"/>
+                <a:ea typeface="DejaVu Sans"/>
               </a:rPr>
               <a:t>I found some null values in the location and timezone fields, i handled them by fill it with ‘None’ value.</a:t>
             </a:r>
-            <a:endParaRPr b="0" lang="en-EG" sz="2000" spc="-1" strike="noStrike">
+            <a:endParaRPr b="0" lang="en-US" sz="2000" spc="-1" strike="noStrike">
               <a:latin typeface="Arial"/>
             </a:endParaRPr>
           </a:p>
@@ -6588,15 +6587,16 @@
               </a:spcBef>
             </a:pPr>
             <a:r>
-              <a:rPr b="1" lang="en-EG" sz="2000" spc="-1" strike="noStrike">
+              <a:rPr b="1" lang="en-US" sz="2000" spc="-1" strike="noStrike">
                 <a:solidFill>
                   <a:srgbClr val="0066cc"/>
                 </a:solidFill>
                 <a:latin typeface="Arial"/>
+                <a:ea typeface="DejaVu Sans"/>
               </a:rPr>
               <a:t>User Handles (@user)</a:t>
             </a:r>
-            <a:endParaRPr b="0" lang="en-EG" sz="2000" spc="-1" strike="noStrike">
+            <a:endParaRPr b="0" lang="en-US" sz="2000" spc="-1" strike="noStrike">
               <a:latin typeface="Arial"/>
             </a:endParaRPr>
           </a:p>
@@ -6610,15 +6610,16 @@
               </a:spcBef>
             </a:pPr>
             <a:r>
-              <a:rPr b="0" lang="en-EG" sz="2000" spc="-1" strike="noStrike">
+              <a:rPr b="0" lang="en-US" sz="2000" spc="-1" strike="noStrike">
                 <a:solidFill>
                   <a:srgbClr val="0066cc"/>
                 </a:solidFill>
                 <a:latin typeface="Arial"/>
+                <a:ea typeface="DejaVu Sans"/>
               </a:rPr>
               <a:t>I removed all @user handles from all tweets text, which will not make difference in the model training.</a:t>
             </a:r>
-            <a:endParaRPr b="0" lang="en-EG" sz="2000" spc="-1" strike="noStrike">
+            <a:endParaRPr b="0" lang="en-US" sz="2000" spc="-1" strike="noStrike">
               <a:latin typeface="Arial"/>
             </a:endParaRPr>
           </a:p>
@@ -6632,15 +6633,16 @@
               </a:spcBef>
             </a:pPr>
             <a:r>
-              <a:rPr b="1" lang="en-EG" sz="2000" spc="-1" strike="noStrike">
+              <a:rPr b="1" lang="en-US" sz="2000" spc="-1" strike="noStrike">
                 <a:solidFill>
                   <a:srgbClr val="0066cc"/>
                 </a:solidFill>
                 <a:latin typeface="Arial"/>
+                <a:ea typeface="DejaVu Sans"/>
               </a:rPr>
               <a:t>Clean the text</a:t>
             </a:r>
-            <a:endParaRPr b="0" lang="en-EG" sz="2000" spc="-1" strike="noStrike">
+            <a:endParaRPr b="0" lang="en-US" sz="2000" spc="-1" strike="noStrike">
               <a:latin typeface="Arial"/>
             </a:endParaRPr>
           </a:p>
@@ -6654,15 +6656,16 @@
               </a:spcBef>
             </a:pPr>
             <a:r>
-              <a:rPr b="0" lang="en-EG" sz="2000" spc="-1" strike="noStrike">
+              <a:rPr b="0" lang="en-US" sz="2000" spc="-1" strike="noStrike">
                 <a:solidFill>
                   <a:srgbClr val="0066cc"/>
                 </a:solidFill>
                 <a:latin typeface="Arial"/>
+                <a:ea typeface="DejaVu Sans"/>
               </a:rPr>
               <a:t>I removed the Punctuations, Numbers, and Special Characters.</a:t>
             </a:r>
-            <a:endParaRPr b="0" lang="en-EG" sz="2000" spc="-1" strike="noStrike">
+            <a:endParaRPr b="0" lang="en-US" sz="2000" spc="-1" strike="noStrike">
               <a:latin typeface="Arial"/>
             </a:endParaRPr>
           </a:p>
@@ -6676,15 +6679,16 @@
               </a:spcBef>
             </a:pPr>
             <a:r>
-              <a:rPr b="1" lang="en-EG" sz="2000" spc="-1" strike="noStrike">
+              <a:rPr b="1" lang="en-US" sz="2000" spc="-1" strike="noStrike">
                 <a:solidFill>
                   <a:srgbClr val="0066cc"/>
                 </a:solidFill>
                 <a:latin typeface="Arial"/>
+                <a:ea typeface="DejaVu Sans"/>
               </a:rPr>
               <a:t>Short words</a:t>
             </a:r>
-            <a:endParaRPr b="0" lang="en-EG" sz="2000" spc="-1" strike="noStrike">
+            <a:endParaRPr b="0" lang="en-US" sz="2000" spc="-1" strike="noStrike">
               <a:latin typeface="Arial"/>
             </a:endParaRPr>
           </a:p>
@@ -6698,15 +6702,16 @@
               </a:spcBef>
             </a:pPr>
             <a:r>
-              <a:rPr b="0" lang="en-EG" sz="2000" spc="-1" strike="noStrike">
+              <a:rPr b="0" lang="en-US" sz="2000" spc="-1" strike="noStrike">
                 <a:solidFill>
                   <a:srgbClr val="0066cc"/>
                 </a:solidFill>
                 <a:latin typeface="Arial"/>
+                <a:ea typeface="DejaVu Sans"/>
               </a:rPr>
               <a:t>I removed the short words &lt; 3 characters.</a:t>
             </a:r>
-            <a:endParaRPr b="0" lang="en-EG" sz="2000" spc="-1" strike="noStrike">
+            <a:endParaRPr b="0" lang="en-US" sz="2000" spc="-1" strike="noStrike">
               <a:latin typeface="Arial"/>
             </a:endParaRPr>
           </a:p>
@@ -6751,7 +6756,7 @@
         <p:spPr>
           <a:xfrm>
             <a:off x="504000" y="284400"/>
-            <a:ext cx="9071280" cy="671040"/>
+            <a:ext cx="9070920" cy="670680"/>
           </a:xfrm>
           <a:prstGeom prst="rect">
             <a:avLst/>
@@ -6778,15 +6783,16 @@
               </a:lnSpc>
             </a:pPr>
             <a:r>
-              <a:rPr b="0" lang="en-EG" sz="4400" spc="-1" strike="noStrike">
+              <a:rPr b="0" lang="en-US" sz="4400" spc="-1" strike="noStrike">
                 <a:solidFill>
                   <a:srgbClr val="ffffff"/>
                 </a:solidFill>
                 <a:latin typeface="Arial"/>
+                <a:ea typeface="DejaVu Sans"/>
               </a:rPr>
               <a:t>Data Cleansing &amp; Pre-processing 2</a:t>
             </a:r>
-            <a:endParaRPr b="0" lang="en-EG" sz="4400" spc="-1" strike="noStrike">
+            <a:endParaRPr b="0" lang="en-US" sz="4400" spc="-1" strike="noStrike">
               <a:latin typeface="Arial"/>
             </a:endParaRPr>
           </a:p>
@@ -6801,7 +6807,7 @@
         <p:spPr>
           <a:xfrm>
             <a:off x="274320" y="1280160"/>
-            <a:ext cx="9459720" cy="4937760"/>
+            <a:ext cx="9459360" cy="4937400"/>
           </a:xfrm>
           <a:prstGeom prst="rect">
             <a:avLst/>
@@ -6827,7 +6833,7 @@
         <p:spPr>
           <a:xfrm>
             <a:off x="255600" y="1136160"/>
-            <a:ext cx="9071280" cy="4846320"/>
+            <a:ext cx="9070920" cy="4845960"/>
           </a:xfrm>
           <a:prstGeom prst="rect">
             <a:avLst/>
@@ -6857,15 +6863,16 @@
               </a:spcBef>
             </a:pPr>
             <a:r>
-              <a:rPr b="1" lang="en-EG" sz="2000" spc="-1" strike="noStrike">
+              <a:rPr b="1" lang="en-US" sz="2000" spc="-1" strike="noStrike">
                 <a:solidFill>
                   <a:srgbClr val="0066cc"/>
                 </a:solidFill>
                 <a:latin typeface="Arial"/>
+                <a:ea typeface="DejaVu Sans"/>
               </a:rPr>
               <a:t>Stemming</a:t>
             </a:r>
-            <a:endParaRPr b="0" lang="en-EG" sz="2000" spc="-1" strike="noStrike">
+            <a:endParaRPr b="0" lang="en-US" sz="2000" spc="-1" strike="noStrike">
               <a:latin typeface="Arial"/>
             </a:endParaRPr>
           </a:p>
@@ -6879,15 +6886,16 @@
               </a:spcBef>
             </a:pPr>
             <a:r>
-              <a:rPr b="0" lang="en-EG" sz="2000" spc="-1" strike="noStrike">
+              <a:rPr b="0" lang="en-US" sz="2000" spc="-1" strike="noStrike">
                 <a:solidFill>
                   <a:srgbClr val="0066cc"/>
                 </a:solidFill>
                 <a:latin typeface="Arial"/>
+                <a:ea typeface="DejaVu Sans"/>
               </a:rPr>
               <a:t>I used Potter Stemmer to normalize all tweets.</a:t>
             </a:r>
-            <a:endParaRPr b="0" lang="en-EG" sz="2000" spc="-1" strike="noStrike">
+            <a:endParaRPr b="0" lang="en-US" sz="2000" spc="-1" strike="noStrike">
               <a:latin typeface="Arial"/>
             </a:endParaRPr>
           </a:p>
@@ -6901,20 +6909,21 @@
               </a:spcBef>
             </a:pPr>
             <a:r>
-              <a:rPr b="1" lang="en-EG" sz="2000" spc="-1" strike="noStrike">
+              <a:rPr b="1" lang="en-US" sz="2000" spc="-1" strike="noStrike">
                 <a:solidFill>
                   <a:srgbClr val="0066cc"/>
                 </a:solidFill>
                 <a:latin typeface="Arial"/>
+                <a:ea typeface="DejaVu Sans"/>
               </a:rPr>
               <a:t>Common words</a:t>
             </a:r>
-            <a:endParaRPr b="0" lang="en-EG" sz="2000" spc="-1" strike="noStrike">
-              <a:latin typeface="Arial"/>
-            </a:endParaRPr>
-          </a:p>
-          <a:p>
-            <a:pPr marL="216000" indent="-216000">
+            <a:endParaRPr b="0" lang="en-US" sz="2000" spc="-1" strike="noStrike">
+              <a:latin typeface="Arial"/>
+            </a:endParaRPr>
+          </a:p>
+          <a:p>
+            <a:pPr marL="216000" indent="-215640">
               <a:lnSpc>
                 <a:spcPct val="100000"/>
               </a:lnSpc>
@@ -6929,15 +6938,16 @@
               <a:buChar char=""/>
             </a:pPr>
             <a:r>
-              <a:rPr b="0" lang="en-EG" sz="2000" spc="-1" strike="noStrike">
+              <a:rPr b="0" lang="en-US" sz="2000" spc="-1" strike="noStrike">
                 <a:solidFill>
                   <a:srgbClr val="0066cc"/>
                 </a:solidFill>
                 <a:latin typeface="Arial"/>
+                <a:ea typeface="DejaVu Sans"/>
               </a:rPr>
               <a:t>I used wordcloud to draw the map of most common words in tweets, words such as (Flights, Plane, Thi, Cancel, Seat).</a:t>
             </a:r>
-            <a:endParaRPr b="0" lang="en-EG" sz="2000" spc="-1" strike="noStrike">
+            <a:endParaRPr b="0" lang="en-US" sz="2000" spc="-1" strike="noStrike">
               <a:latin typeface="Arial"/>
             </a:endParaRPr>
           </a:p>
@@ -6982,7 +6992,7 @@
         <p:spPr>
           <a:xfrm>
             <a:off x="504000" y="284400"/>
-            <a:ext cx="9071280" cy="671040"/>
+            <a:ext cx="9070920" cy="670680"/>
           </a:xfrm>
           <a:prstGeom prst="rect">
             <a:avLst/>
@@ -7009,15 +7019,16 @@
               </a:lnSpc>
             </a:pPr>
             <a:r>
-              <a:rPr b="0" lang="en-EG" sz="4400" spc="-1" strike="noStrike">
+              <a:rPr b="0" lang="en-US" sz="4400" spc="-1" strike="noStrike">
                 <a:solidFill>
                   <a:srgbClr val="ffffff"/>
                 </a:solidFill>
                 <a:latin typeface="Arial"/>
+                <a:ea typeface="DejaVu Sans"/>
               </a:rPr>
               <a:t>Model Training</a:t>
             </a:r>
-            <a:endParaRPr b="0" lang="en-EG" sz="4400" spc="-1" strike="noStrike">
+            <a:endParaRPr b="0" lang="en-US" sz="4400" spc="-1" strike="noStrike">
               <a:latin typeface="Arial"/>
             </a:endParaRPr>
           </a:p>
@@ -7032,7 +7043,7 @@
         <p:spPr>
           <a:xfrm>
             <a:off x="274320" y="1280160"/>
-            <a:ext cx="9459720" cy="4937760"/>
+            <a:ext cx="9459360" cy="4937400"/>
           </a:xfrm>
           <a:prstGeom prst="rect">
             <a:avLst/>
@@ -7058,7 +7069,7 @@
         <p:spPr>
           <a:xfrm>
             <a:off x="255600" y="1136160"/>
-            <a:ext cx="9071280" cy="4846320"/>
+            <a:ext cx="9070920" cy="4845960"/>
           </a:xfrm>
           <a:prstGeom prst="rect">
             <a:avLst/>
@@ -7079,7 +7090,7 @@
             <a:noAutofit/>
           </a:bodyPr>
           <a:p>
-            <a:pPr marL="432000" indent="-323640">
+            <a:pPr marL="432000" indent="-323280">
               <a:lnSpc>
                 <a:spcPct val="100000"/>
               </a:lnSpc>
@@ -7094,20 +7105,21 @@
               <a:buChar char=""/>
             </a:pPr>
             <a:r>
-              <a:rPr b="0" lang="en-EG" sz="2600" spc="-1" strike="noStrike">
+              <a:rPr b="0" lang="en-US" sz="2600" spc="-1" strike="noStrike">
                 <a:solidFill>
                   <a:srgbClr val="0066cc"/>
                 </a:solidFill>
                 <a:latin typeface="Arial"/>
+                <a:ea typeface="DejaVu Sans"/>
               </a:rPr>
               <a:t>I created test set of 20% of the total data.</a:t>
             </a:r>
-            <a:endParaRPr b="0" lang="en-EG" sz="2600" spc="-1" strike="noStrike">
-              <a:latin typeface="Arial"/>
-            </a:endParaRPr>
-          </a:p>
-          <a:p>
-            <a:pPr marL="432000" indent="-323640">
+            <a:endParaRPr b="0" lang="en-US" sz="2600" spc="-1" strike="noStrike">
+              <a:latin typeface="Arial"/>
+            </a:endParaRPr>
+          </a:p>
+          <a:p>
+            <a:pPr marL="432000" indent="-323280">
               <a:lnSpc>
                 <a:spcPct val="100000"/>
               </a:lnSpc>
@@ -7122,20 +7134,21 @@
               <a:buChar char=""/>
             </a:pPr>
             <a:r>
-              <a:rPr b="0" lang="en-EG" sz="2600" spc="-1" strike="noStrike">
+              <a:rPr b="0" lang="en-US" sz="2600" spc="-1" strike="noStrike">
                 <a:solidFill>
                   <a:srgbClr val="0066cc"/>
                 </a:solidFill>
                 <a:latin typeface="Arial"/>
+                <a:ea typeface="DejaVu Sans"/>
               </a:rPr>
               <a:t>I used TF-IDF vectorizer to create the features, with L2 normalization,  ngram of 1 word and English stop words.</a:t>
             </a:r>
-            <a:endParaRPr b="0" lang="en-EG" sz="2600" spc="-1" strike="noStrike">
-              <a:latin typeface="Arial"/>
-            </a:endParaRPr>
-          </a:p>
-          <a:p>
-            <a:pPr marL="432000" indent="-323640">
+            <a:endParaRPr b="0" lang="en-US" sz="2600" spc="-1" strike="noStrike">
+              <a:latin typeface="Arial"/>
+            </a:endParaRPr>
+          </a:p>
+          <a:p>
+            <a:pPr marL="432000" indent="-323280">
               <a:lnSpc>
                 <a:spcPct val="100000"/>
               </a:lnSpc>
@@ -7150,7 +7163,7 @@
               <a:buChar char=""/>
             </a:pPr>
             <a:r>
-              <a:rPr b="0" lang="en-EG" sz="2600" spc="-1" strike="noStrike">
+              <a:rPr b="0" lang="en-US" sz="2600" spc="-1" strike="noStrike">
                 <a:solidFill>
                   <a:srgbClr val="0066cc"/>
                 </a:solidFill>
@@ -7160,15 +7173,16 @@
               <a:t>I tried different models and check the accuracy. e.g. SVM, logistic regression, naiive bayes, ...).</a:t>
             </a:r>
             <a:r>
-              <a:rPr b="0" lang="en-EG" sz="2600" spc="-1" strike="noStrike">
+              <a:rPr b="0" lang="en-US" sz="2600" spc="-1" strike="noStrike">
                 <a:solidFill>
                   <a:srgbClr val="0066cc"/>
                 </a:solidFill>
                 <a:latin typeface="Arial"/>
+                <a:ea typeface="DejaVu Sans"/>
               </a:rPr>
               <a:t>check next page for results.</a:t>
             </a:r>
-            <a:endParaRPr b="0" lang="en-EG" sz="2600" spc="-1" strike="noStrike">
+            <a:endParaRPr b="0" lang="en-US" sz="2600" spc="-1" strike="noStrike">
               <a:latin typeface="Arial"/>
             </a:endParaRPr>
           </a:p>
@@ -7213,7 +7227,7 @@
         <p:spPr>
           <a:xfrm>
             <a:off x="504000" y="284400"/>
-            <a:ext cx="9071280" cy="671040"/>
+            <a:ext cx="9070920" cy="670680"/>
           </a:xfrm>
           <a:prstGeom prst="rect">
             <a:avLst/>
@@ -7240,15 +7254,16 @@
               </a:lnSpc>
             </a:pPr>
             <a:r>
-              <a:rPr b="0" lang="en-EG" sz="4400" spc="-1" strike="noStrike">
+              <a:rPr b="0" lang="en-US" sz="4400" spc="-1" strike="noStrike">
                 <a:solidFill>
                   <a:srgbClr val="ffffff"/>
                 </a:solidFill>
                 <a:latin typeface="Arial"/>
+                <a:ea typeface="DejaVu Sans"/>
               </a:rPr>
               <a:t>Results</a:t>
             </a:r>
-            <a:endParaRPr b="0" lang="en-EG" sz="4400" spc="-1" strike="noStrike">
+            <a:endParaRPr b="0" lang="en-US" sz="4400" spc="-1" strike="noStrike">
               <a:latin typeface="Arial"/>
             </a:endParaRPr>
           </a:p>
@@ -7263,7 +7278,7 @@
         <p:spPr>
           <a:xfrm>
             <a:off x="274320" y="1280160"/>
-            <a:ext cx="9459720" cy="4937760"/>
+            <a:ext cx="9459360" cy="4937400"/>
           </a:xfrm>
           <a:prstGeom prst="rect">
             <a:avLst/>
@@ -7289,7 +7304,7 @@
         <p:spPr>
           <a:xfrm>
             <a:off x="255600" y="1136160"/>
-            <a:ext cx="9071280" cy="4846320"/>
+            <a:ext cx="9070920" cy="4845960"/>
           </a:xfrm>
           <a:prstGeom prst="rect">
             <a:avLst/>
@@ -7310,7 +7325,7 @@
             <a:noAutofit/>
           </a:bodyPr>
           <a:p>
-            <a:pPr marL="432000" indent="-323640">
+            <a:pPr marL="432000" indent="-323280">
               <a:lnSpc>
                 <a:spcPct val="100000"/>
               </a:lnSpc>
@@ -7325,34 +7340,29 @@
               <a:buChar char=""/>
             </a:pPr>
             <a:r>
-              <a:rPr b="0" lang="en-EG" sz="2600" spc="-1" strike="noStrike">
+              <a:rPr b="0" lang="en-US" sz="2600" spc="-1" strike="noStrike">
                 <a:solidFill>
                   <a:srgbClr val="0066cc"/>
                 </a:solidFill>
                 <a:latin typeface="Arial"/>
+                <a:ea typeface="DejaVu Sans"/>
               </a:rPr>
               <a:t>Naiive Bayes</a:t>
             </a:r>
-            <a:endParaRPr b="0" lang="en-EG" sz="2600" spc="-1" strike="noStrike">
-              <a:latin typeface="Arial"/>
-            </a:endParaRPr>
-          </a:p>
-          <a:p>
-            <a:pPr marL="432000" indent="-323640">
+            <a:endParaRPr b="0" lang="en-US" sz="2600" spc="-1" strike="noStrike">
+              <a:latin typeface="Arial"/>
+            </a:endParaRPr>
+          </a:p>
+          <a:p>
+            <a:pPr>
               <a:lnSpc>
                 <a:spcPct val="100000"/>
               </a:lnSpc>
               <a:spcBef>
                 <a:spcPts val="1417"/>
               </a:spcBef>
-              <a:buClr>
-                <a:srgbClr val="000000"/>
-              </a:buClr>
-              <a:buSzPct val="45000"/>
-              <a:buFont typeface="Wingdings" charset="2"/>
-              <a:buChar char=""/>
             </a:pPr>
-            <a:endParaRPr b="0" lang="en-EG" sz="2600" spc="-1" strike="noStrike">
+            <a:endParaRPr b="0" lang="en-US" sz="2600" spc="-1" strike="noStrike">
               <a:latin typeface="Arial"/>
             </a:endParaRPr>
           </a:p>
@@ -7371,7 +7381,7 @@
         <p:spPr>
           <a:xfrm>
             <a:off x="721800" y="1735200"/>
-            <a:ext cx="8952840" cy="4208400"/>
+            <a:ext cx="8952480" cy="4208040"/>
           </a:xfrm>
           <a:prstGeom prst="rect">
             <a:avLst/>
@@ -7420,7 +7430,7 @@
         <p:spPr>
           <a:xfrm>
             <a:off x="504000" y="284400"/>
-            <a:ext cx="9071280" cy="671040"/>
+            <a:ext cx="9070920" cy="670680"/>
           </a:xfrm>
           <a:prstGeom prst="rect">
             <a:avLst/>
@@ -7447,15 +7457,16 @@
               </a:lnSpc>
             </a:pPr>
             <a:r>
-              <a:rPr b="0" lang="en-EG" sz="4400" spc="-1" strike="noStrike">
+              <a:rPr b="0" lang="en-US" sz="4400" spc="-1" strike="noStrike">
                 <a:solidFill>
                   <a:srgbClr val="ffffff"/>
                 </a:solidFill>
                 <a:latin typeface="Arial"/>
+                <a:ea typeface="DejaVu Sans"/>
               </a:rPr>
               <a:t>Results</a:t>
             </a:r>
-            <a:endParaRPr b="0" lang="en-EG" sz="4400" spc="-1" strike="noStrike">
+            <a:endParaRPr b="0" lang="en-US" sz="4400" spc="-1" strike="noStrike">
               <a:latin typeface="Arial"/>
             </a:endParaRPr>
           </a:p>
@@ -7470,7 +7481,7 @@
         <p:spPr>
           <a:xfrm>
             <a:off x="274320" y="1280160"/>
-            <a:ext cx="9459720" cy="4937760"/>
+            <a:ext cx="9459360" cy="4937400"/>
           </a:xfrm>
           <a:prstGeom prst="rect">
             <a:avLst/>
@@ -7496,7 +7507,7 @@
         <p:spPr>
           <a:xfrm>
             <a:off x="255600" y="1136160"/>
-            <a:ext cx="9071280" cy="4846320"/>
+            <a:ext cx="9070920" cy="4845960"/>
           </a:xfrm>
           <a:prstGeom prst="rect">
             <a:avLst/>
@@ -7517,7 +7528,7 @@
             <a:noAutofit/>
           </a:bodyPr>
           <a:p>
-            <a:pPr marL="432000" indent="-323640">
+            <a:pPr marL="432000" indent="-323280">
               <a:lnSpc>
                 <a:spcPct val="100000"/>
               </a:lnSpc>
@@ -7532,34 +7543,29 @@
               <a:buChar char=""/>
             </a:pPr>
             <a:r>
-              <a:rPr b="0" lang="en-EG" sz="2600" spc="-1" strike="noStrike">
+              <a:rPr b="0" lang="en-US" sz="2600" spc="-1" strike="noStrike">
                 <a:solidFill>
                   <a:srgbClr val="0066cc"/>
                 </a:solidFill>
                 <a:latin typeface="Arial"/>
+                <a:ea typeface="DejaVu Sans"/>
               </a:rPr>
               <a:t>RandomForest</a:t>
             </a:r>
-            <a:endParaRPr b="0" lang="en-EG" sz="2600" spc="-1" strike="noStrike">
-              <a:latin typeface="Arial"/>
-            </a:endParaRPr>
-          </a:p>
-          <a:p>
-            <a:pPr marL="432000" indent="-323640">
+            <a:endParaRPr b="0" lang="en-US" sz="2600" spc="-1" strike="noStrike">
+              <a:latin typeface="Arial"/>
+            </a:endParaRPr>
+          </a:p>
+          <a:p>
+            <a:pPr>
               <a:lnSpc>
                 <a:spcPct val="100000"/>
               </a:lnSpc>
               <a:spcBef>
                 <a:spcPts val="1417"/>
               </a:spcBef>
-              <a:buClr>
-                <a:srgbClr val="000000"/>
-              </a:buClr>
-              <a:buSzPct val="45000"/>
-              <a:buFont typeface="Wingdings" charset="2"/>
-              <a:buChar char=""/>
             </a:pPr>
-            <a:endParaRPr b="0" lang="en-EG" sz="2600" spc="-1" strike="noStrike">
+            <a:endParaRPr b="0" lang="en-US" sz="2600" spc="-1" strike="noStrike">
               <a:latin typeface="Arial"/>
             </a:endParaRPr>
           </a:p>
@@ -7578,7 +7584,7 @@
         <p:spPr>
           <a:xfrm>
             <a:off x="640080" y="1645920"/>
-            <a:ext cx="9037440" cy="3840480"/>
+            <a:ext cx="9037080" cy="3840120"/>
           </a:xfrm>
           <a:prstGeom prst="rect">
             <a:avLst/>

</xml_diff>